<commit_message>
Inyección de Dependencias,Multicatch y Try with resources
</commit_message>
<xml_diff>
--- a/Exámenes/Semana02/Presentación.pptx
+++ b/Exámenes/Semana02/Presentación.pptx
@@ -7,16 +7,21 @@
   <p:sldIdLst>
     <p:sldId id="256" r:id="rId2"/>
     <p:sldId id="257" r:id="rId3"/>
-    <p:sldId id="258" r:id="rId4"/>
-    <p:sldId id="263" r:id="rId5"/>
-    <p:sldId id="264" r:id="rId6"/>
-    <p:sldId id="265" r:id="rId7"/>
-    <p:sldId id="259" r:id="rId8"/>
-    <p:sldId id="266" r:id="rId9"/>
-    <p:sldId id="260" r:id="rId10"/>
-    <p:sldId id="261" r:id="rId11"/>
-    <p:sldId id="262" r:id="rId12"/>
-    <p:sldId id="267" r:id="rId13"/>
+    <p:sldId id="271" r:id="rId4"/>
+    <p:sldId id="272" r:id="rId5"/>
+    <p:sldId id="268" r:id="rId6"/>
+    <p:sldId id="258" r:id="rId7"/>
+    <p:sldId id="263" r:id="rId8"/>
+    <p:sldId id="264" r:id="rId9"/>
+    <p:sldId id="265" r:id="rId10"/>
+    <p:sldId id="259" r:id="rId11"/>
+    <p:sldId id="266" r:id="rId12"/>
+    <p:sldId id="260" r:id="rId13"/>
+    <p:sldId id="270" r:id="rId14"/>
+    <p:sldId id="261" r:id="rId15"/>
+    <p:sldId id="269" r:id="rId16"/>
+    <p:sldId id="262" r:id="rId17"/>
+    <p:sldId id="267" r:id="rId18"/>
   </p:sldIdLst>
   <p:sldSz cx="12192000" cy="6858000"/>
   <p:notesSz cx="6858000" cy="9144000"/>
@@ -115,6 +120,11 @@
       </a:defRPr>
     </a:lvl9pPr>
   </p:defaultTextStyle>
+  <p:extLst>
+    <p:ext uri="{EFAFB233-063F-42B5-8137-9DF3F51BA10A}">
+      <p15:sldGuideLst xmlns:p15="http://schemas.microsoft.com/office/powerpoint/2012/main"/>
+    </p:ext>
+  </p:extLst>
 </p:presentation>
 </file>
 
@@ -267,7 +277,7 @@
           <a:p>
             <a:fld id="{C054015C-A5DA-420E-8DCC-C0E84462F69C}" type="datetimeFigureOut">
               <a:rPr lang="es-MX" smtClean="0"/>
-              <a:t>29/11/2022</a:t>
+              <a:t>30/11/2022</a:t>
             </a:fld>
             <a:endParaRPr lang="es-MX"/>
           </a:p>
@@ -467,7 +477,7 @@
           <a:p>
             <a:fld id="{C054015C-A5DA-420E-8DCC-C0E84462F69C}" type="datetimeFigureOut">
               <a:rPr lang="es-MX" smtClean="0"/>
-              <a:t>29/11/2022</a:t>
+              <a:t>30/11/2022</a:t>
             </a:fld>
             <a:endParaRPr lang="es-MX"/>
           </a:p>
@@ -677,7 +687,7 @@
           <a:p>
             <a:fld id="{C054015C-A5DA-420E-8DCC-C0E84462F69C}" type="datetimeFigureOut">
               <a:rPr lang="es-MX" smtClean="0"/>
-              <a:t>29/11/2022</a:t>
+              <a:t>30/11/2022</a:t>
             </a:fld>
             <a:endParaRPr lang="es-MX"/>
           </a:p>
@@ -877,7 +887,7 @@
           <a:p>
             <a:fld id="{C054015C-A5DA-420E-8DCC-C0E84462F69C}" type="datetimeFigureOut">
               <a:rPr lang="es-MX" smtClean="0"/>
-              <a:t>29/11/2022</a:t>
+              <a:t>30/11/2022</a:t>
             </a:fld>
             <a:endParaRPr lang="es-MX"/>
           </a:p>
@@ -1153,7 +1163,7 @@
           <a:p>
             <a:fld id="{C054015C-A5DA-420E-8DCC-C0E84462F69C}" type="datetimeFigureOut">
               <a:rPr lang="es-MX" smtClean="0"/>
-              <a:t>29/11/2022</a:t>
+              <a:t>30/11/2022</a:t>
             </a:fld>
             <a:endParaRPr lang="es-MX"/>
           </a:p>
@@ -1421,7 +1431,7 @@
           <a:p>
             <a:fld id="{C054015C-A5DA-420E-8DCC-C0E84462F69C}" type="datetimeFigureOut">
               <a:rPr lang="es-MX" smtClean="0"/>
-              <a:t>29/11/2022</a:t>
+              <a:t>30/11/2022</a:t>
             </a:fld>
             <a:endParaRPr lang="es-MX"/>
           </a:p>
@@ -1836,7 +1846,7 @@
           <a:p>
             <a:fld id="{C054015C-A5DA-420E-8DCC-C0E84462F69C}" type="datetimeFigureOut">
               <a:rPr lang="es-MX" smtClean="0"/>
-              <a:t>29/11/2022</a:t>
+              <a:t>30/11/2022</a:t>
             </a:fld>
             <a:endParaRPr lang="es-MX"/>
           </a:p>
@@ -1978,7 +1988,7 @@
           <a:p>
             <a:fld id="{C054015C-A5DA-420E-8DCC-C0E84462F69C}" type="datetimeFigureOut">
               <a:rPr lang="es-MX" smtClean="0"/>
-              <a:t>29/11/2022</a:t>
+              <a:t>30/11/2022</a:t>
             </a:fld>
             <a:endParaRPr lang="es-MX"/>
           </a:p>
@@ -2091,7 +2101,7 @@
           <a:p>
             <a:fld id="{C054015C-A5DA-420E-8DCC-C0E84462F69C}" type="datetimeFigureOut">
               <a:rPr lang="es-MX" smtClean="0"/>
-              <a:t>29/11/2022</a:t>
+              <a:t>30/11/2022</a:t>
             </a:fld>
             <a:endParaRPr lang="es-MX"/>
           </a:p>
@@ -2404,7 +2414,7 @@
           <a:p>
             <a:fld id="{C054015C-A5DA-420E-8DCC-C0E84462F69C}" type="datetimeFigureOut">
               <a:rPr lang="es-MX" smtClean="0"/>
-              <a:t>29/11/2022</a:t>
+              <a:t>30/11/2022</a:t>
             </a:fld>
             <a:endParaRPr lang="es-MX"/>
           </a:p>
@@ -2693,7 +2703,7 @@
           <a:p>
             <a:fld id="{C054015C-A5DA-420E-8DCC-C0E84462F69C}" type="datetimeFigureOut">
               <a:rPr lang="es-MX" smtClean="0"/>
-              <a:t>29/11/2022</a:t>
+              <a:t>30/11/2022</a:t>
             </a:fld>
             <a:endParaRPr lang="es-MX"/>
           </a:p>
@@ -2936,7 +2946,7 @@
           <a:p>
             <a:fld id="{C054015C-A5DA-420E-8DCC-C0E84462F69C}" type="datetimeFigureOut">
               <a:rPr lang="es-MX" smtClean="0"/>
-              <a:t>29/11/2022</a:t>
+              <a:t>30/11/2022</a:t>
             </a:fld>
             <a:endParaRPr lang="es-MX"/>
           </a:p>
@@ -3673,13 +3683,13 @@
         </p:nvSpPr>
         <p:spPr>
           <a:xfrm>
-            <a:off x="2076408" y="3031283"/>
+            <a:off x="2076408" y="2794992"/>
             <a:ext cx="7822096" cy="1151076"/>
           </a:xfrm>
         </p:spPr>
         <p:txBody>
           <a:bodyPr>
-            <a:normAutofit fontScale="90000"/>
+            <a:normAutofit/>
           </a:bodyPr>
           <a:lstStyle/>
           <a:p>
@@ -3687,19 +3697,7 @@
               <a:rPr lang="es-ES" b="1" dirty="0" err="1">
                 <a:latin typeface="Britannic Bold" panose="020B0903060703020204" pitchFamily="34" charset="0"/>
               </a:rPr>
-              <a:t>Multicatch</a:t>
-            </a:r>
-            <a:r>
-              <a:rPr lang="es-ES" b="1" dirty="0">
-                <a:latin typeface="Britannic Bold" panose="020B0903060703020204" pitchFamily="34" charset="0"/>
-              </a:rPr>
-              <a:t> and Try </a:t>
-            </a:r>
-            <a:r>
-              <a:rPr lang="es-ES" b="1" dirty="0" err="1">
-                <a:latin typeface="Britannic Bold" panose="020B0903060703020204" pitchFamily="34" charset="0"/>
-              </a:rPr>
-              <a:t>with</a:t>
+              <a:t>Types</a:t>
             </a:r>
             <a:r>
               <a:rPr lang="es-ES" b="1" dirty="0">
@@ -3711,7 +3709,19 @@
               <a:rPr lang="es-ES" b="1" dirty="0" err="1">
                 <a:latin typeface="Britannic Bold" panose="020B0903060703020204" pitchFamily="34" charset="0"/>
               </a:rPr>
-              <a:t>resources</a:t>
+              <a:t>of</a:t>
+            </a:r>
+            <a:r>
+              <a:rPr lang="es-ES" b="1" dirty="0">
+                <a:latin typeface="Britannic Bold" panose="020B0903060703020204" pitchFamily="34" charset="0"/>
+              </a:rPr>
+              <a:t> </a:t>
+            </a:r>
+            <a:r>
+              <a:rPr lang="es-ES" b="1" dirty="0" err="1">
+                <a:latin typeface="Britannic Bold" panose="020B0903060703020204" pitchFamily="34" charset="0"/>
+              </a:rPr>
+              <a:t>Exceptions</a:t>
             </a:r>
             <a:endParaRPr lang="es-MX" dirty="0">
               <a:latin typeface="Britannic Bold" panose="020B0903060703020204" pitchFamily="34" charset="0"/>
@@ -3810,7 +3820,7 @@
     </p:spTree>
     <p:extLst>
       <p:ext uri="{BB962C8B-B14F-4D97-AF65-F5344CB8AC3E}">
-        <p14:creationId xmlns:p14="http://schemas.microsoft.com/office/powerpoint/2010/main" val="3195034610"/>
+        <p14:creationId xmlns:p14="http://schemas.microsoft.com/office/powerpoint/2010/main" val="2789416840"/>
       </p:ext>
     </p:extLst>
   </p:cSld>
@@ -3875,6 +3885,622 @@
       </p:pic>
       <p:sp>
         <p:nvSpPr>
+          <p:cNvPr id="6" name="Rectángulo: esquinas redondeadas 5">
+            <a:extLst>
+              <a:ext uri="{FF2B5EF4-FFF2-40B4-BE49-F238E27FC236}">
+                <a16:creationId xmlns:a16="http://schemas.microsoft.com/office/drawing/2014/main" id="{6B884CC6-CD28-46B5-A81E-F108CB1124A0}"/>
+              </a:ext>
+            </a:extLst>
+          </p:cNvPr>
+          <p:cNvSpPr/>
+          <p:nvPr/>
+        </p:nvSpPr>
+        <p:spPr>
+          <a:xfrm>
+            <a:off x="5221355" y="795130"/>
+            <a:ext cx="2676939" cy="834887"/>
+          </a:xfrm>
+          <a:prstGeom prst="roundRect">
+            <a:avLst/>
+          </a:prstGeom>
+          <a:solidFill>
+            <a:srgbClr val="FF0000"/>
+          </a:solidFill>
+          <a:ln>
+            <a:noFill/>
+          </a:ln>
+        </p:spPr>
+        <p:style>
+          <a:lnRef idx="2">
+            <a:schemeClr val="accent1">
+              <a:shade val="50000"/>
+            </a:schemeClr>
+          </a:lnRef>
+          <a:fillRef idx="1">
+            <a:schemeClr val="accent1"/>
+          </a:fillRef>
+          <a:effectRef idx="0">
+            <a:schemeClr val="accent1"/>
+          </a:effectRef>
+          <a:fontRef idx="minor">
+            <a:schemeClr val="lt1"/>
+          </a:fontRef>
+        </p:style>
+        <p:txBody>
+          <a:bodyPr rtlCol="0" anchor="ctr"/>
+          <a:lstStyle/>
+          <a:p>
+            <a:pPr algn="ctr"/>
+            <a:r>
+              <a:rPr lang="es-MX" dirty="0" err="1"/>
+              <a:t>Throwable</a:t>
+            </a:r>
+            <a:endParaRPr lang="es-MX" dirty="0"/>
+          </a:p>
+        </p:txBody>
+      </p:sp>
+      <p:sp>
+        <p:nvSpPr>
+          <p:cNvPr id="9" name="Rectángulo: esquinas redondeadas 8">
+            <a:extLst>
+              <a:ext uri="{FF2B5EF4-FFF2-40B4-BE49-F238E27FC236}">
+                <a16:creationId xmlns:a16="http://schemas.microsoft.com/office/drawing/2014/main" id="{4187EB94-CAAA-47B4-99A8-93334B771AD7}"/>
+              </a:ext>
+            </a:extLst>
+          </p:cNvPr>
+          <p:cNvSpPr/>
+          <p:nvPr/>
+        </p:nvSpPr>
+        <p:spPr>
+          <a:xfrm>
+            <a:off x="3220279" y="2843832"/>
+            <a:ext cx="2676939" cy="834887"/>
+          </a:xfrm>
+          <a:prstGeom prst="roundRect">
+            <a:avLst/>
+          </a:prstGeom>
+          <a:solidFill>
+            <a:srgbClr val="E13927"/>
+          </a:solidFill>
+          <a:ln>
+            <a:noFill/>
+          </a:ln>
+        </p:spPr>
+        <p:style>
+          <a:lnRef idx="2">
+            <a:schemeClr val="accent1">
+              <a:shade val="50000"/>
+            </a:schemeClr>
+          </a:lnRef>
+          <a:fillRef idx="1">
+            <a:schemeClr val="accent1"/>
+          </a:fillRef>
+          <a:effectRef idx="0">
+            <a:schemeClr val="accent1"/>
+          </a:effectRef>
+          <a:fontRef idx="minor">
+            <a:schemeClr val="lt1"/>
+          </a:fontRef>
+        </p:style>
+        <p:txBody>
+          <a:bodyPr rtlCol="0" anchor="ctr"/>
+          <a:lstStyle/>
+          <a:p>
+            <a:pPr algn="ctr"/>
+            <a:r>
+              <a:rPr lang="es-MX" dirty="0" err="1"/>
+              <a:t>Exception</a:t>
+            </a:r>
+            <a:endParaRPr lang="es-MX" dirty="0"/>
+          </a:p>
+        </p:txBody>
+      </p:sp>
+      <p:sp>
+        <p:nvSpPr>
+          <p:cNvPr id="11" name="Rectángulo: esquinas redondeadas 10">
+            <a:extLst>
+              <a:ext uri="{FF2B5EF4-FFF2-40B4-BE49-F238E27FC236}">
+                <a16:creationId xmlns:a16="http://schemas.microsoft.com/office/drawing/2014/main" id="{156BDB3B-5C26-491B-8F85-A6E6B40CAC33}"/>
+              </a:ext>
+            </a:extLst>
+          </p:cNvPr>
+          <p:cNvSpPr/>
+          <p:nvPr/>
+        </p:nvSpPr>
+        <p:spPr>
+          <a:xfrm>
+            <a:off x="7706139" y="2843832"/>
+            <a:ext cx="2676939" cy="834887"/>
+          </a:xfrm>
+          <a:prstGeom prst="roundRect">
+            <a:avLst/>
+          </a:prstGeom>
+          <a:solidFill>
+            <a:srgbClr val="BC4C4C"/>
+          </a:solidFill>
+          <a:ln>
+            <a:noFill/>
+          </a:ln>
+        </p:spPr>
+        <p:style>
+          <a:lnRef idx="2">
+            <a:schemeClr val="accent1">
+              <a:shade val="50000"/>
+            </a:schemeClr>
+          </a:lnRef>
+          <a:fillRef idx="1">
+            <a:schemeClr val="accent1"/>
+          </a:fillRef>
+          <a:effectRef idx="0">
+            <a:schemeClr val="accent1"/>
+          </a:effectRef>
+          <a:fontRef idx="minor">
+            <a:schemeClr val="lt1"/>
+          </a:fontRef>
+        </p:style>
+        <p:txBody>
+          <a:bodyPr rtlCol="0" anchor="ctr"/>
+          <a:lstStyle/>
+          <a:p>
+            <a:pPr algn="ctr"/>
+            <a:r>
+              <a:rPr lang="es-MX" dirty="0"/>
+              <a:t>Error</a:t>
+            </a:r>
+          </a:p>
+        </p:txBody>
+      </p:sp>
+      <p:sp>
+        <p:nvSpPr>
+          <p:cNvPr id="12" name="Rectángulo: esquinas redondeadas 11">
+            <a:extLst>
+              <a:ext uri="{FF2B5EF4-FFF2-40B4-BE49-F238E27FC236}">
+                <a16:creationId xmlns:a16="http://schemas.microsoft.com/office/drawing/2014/main" id="{506DF178-B5C9-484C-BD17-89C13E5301EE}"/>
+              </a:ext>
+            </a:extLst>
+          </p:cNvPr>
+          <p:cNvSpPr/>
+          <p:nvPr/>
+        </p:nvSpPr>
+        <p:spPr>
+          <a:xfrm>
+            <a:off x="1961325" y="4892534"/>
+            <a:ext cx="2676939" cy="834887"/>
+          </a:xfrm>
+          <a:prstGeom prst="roundRect">
+            <a:avLst/>
+          </a:prstGeom>
+          <a:solidFill>
+            <a:srgbClr val="E13927"/>
+          </a:solidFill>
+          <a:ln>
+            <a:noFill/>
+          </a:ln>
+        </p:spPr>
+        <p:style>
+          <a:lnRef idx="2">
+            <a:schemeClr val="accent1">
+              <a:shade val="50000"/>
+            </a:schemeClr>
+          </a:lnRef>
+          <a:fillRef idx="1">
+            <a:schemeClr val="accent1"/>
+          </a:fillRef>
+          <a:effectRef idx="0">
+            <a:schemeClr val="accent1"/>
+          </a:effectRef>
+          <a:fontRef idx="minor">
+            <a:schemeClr val="lt1"/>
+          </a:fontRef>
+        </p:style>
+        <p:txBody>
+          <a:bodyPr rtlCol="0" anchor="ctr"/>
+          <a:lstStyle/>
+          <a:p>
+            <a:pPr algn="ctr"/>
+            <a:r>
+              <a:rPr lang="es-MX" dirty="0" err="1"/>
+              <a:t>RunTimeException</a:t>
+            </a:r>
+            <a:endParaRPr lang="es-MX" dirty="0"/>
+          </a:p>
+        </p:txBody>
+      </p:sp>
+      <p:sp>
+        <p:nvSpPr>
+          <p:cNvPr id="13" name="Rectángulo: esquinas redondeadas 12">
+            <a:extLst>
+              <a:ext uri="{FF2B5EF4-FFF2-40B4-BE49-F238E27FC236}">
+                <a16:creationId xmlns:a16="http://schemas.microsoft.com/office/drawing/2014/main" id="{08E37D9E-2CA0-4BD8-8071-0ED534F63402}"/>
+              </a:ext>
+            </a:extLst>
+          </p:cNvPr>
+          <p:cNvSpPr/>
+          <p:nvPr/>
+        </p:nvSpPr>
+        <p:spPr>
+          <a:xfrm>
+            <a:off x="5221357" y="4892534"/>
+            <a:ext cx="2676939" cy="834887"/>
+          </a:xfrm>
+          <a:prstGeom prst="roundRect">
+            <a:avLst/>
+          </a:prstGeom>
+          <a:solidFill>
+            <a:srgbClr val="E13927"/>
+          </a:solidFill>
+          <a:ln>
+            <a:noFill/>
+          </a:ln>
+        </p:spPr>
+        <p:style>
+          <a:lnRef idx="2">
+            <a:schemeClr val="accent1">
+              <a:shade val="50000"/>
+            </a:schemeClr>
+          </a:lnRef>
+          <a:fillRef idx="1">
+            <a:schemeClr val="accent1"/>
+          </a:fillRef>
+          <a:effectRef idx="0">
+            <a:schemeClr val="accent1"/>
+          </a:effectRef>
+          <a:fontRef idx="minor">
+            <a:schemeClr val="lt1"/>
+          </a:fontRef>
+        </p:style>
+        <p:txBody>
+          <a:bodyPr rtlCol="0" anchor="ctr"/>
+          <a:lstStyle/>
+          <a:p>
+            <a:pPr algn="ctr"/>
+            <a:r>
+              <a:rPr lang="es-MX" dirty="0" err="1"/>
+              <a:t>Other</a:t>
+            </a:r>
+            <a:r>
+              <a:rPr lang="es-MX" dirty="0"/>
+              <a:t> </a:t>
+            </a:r>
+            <a:r>
+              <a:rPr lang="es-MX" dirty="0" err="1"/>
+              <a:t>Exceptions</a:t>
+            </a:r>
+            <a:endParaRPr lang="es-MX" dirty="0"/>
+          </a:p>
+        </p:txBody>
+      </p:sp>
+      <p:cxnSp>
+        <p:nvCxnSpPr>
+          <p:cNvPr id="14" name="Conector: angular 13">
+            <a:extLst>
+              <a:ext uri="{FF2B5EF4-FFF2-40B4-BE49-F238E27FC236}">
+                <a16:creationId xmlns:a16="http://schemas.microsoft.com/office/drawing/2014/main" id="{3C7A4881-440D-4E36-80A7-040CA28AF1D0}"/>
+              </a:ext>
+            </a:extLst>
+          </p:cNvPr>
+          <p:cNvCxnSpPr>
+            <a:stCxn id="6" idx="2"/>
+            <a:endCxn id="9" idx="0"/>
+          </p:cNvCxnSpPr>
+          <p:nvPr/>
+        </p:nvCxnSpPr>
+        <p:spPr>
+          <a:xfrm rot="5400000">
+            <a:off x="4952380" y="1236386"/>
+            <a:ext cx="1213815" cy="2001076"/>
+          </a:xfrm>
+          <a:prstGeom prst="bentConnector3">
+            <a:avLst/>
+          </a:prstGeom>
+          <a:ln w="76200">
+            <a:solidFill>
+              <a:schemeClr val="tx1">
+                <a:lumMod val="95000"/>
+                <a:lumOff val="5000"/>
+              </a:schemeClr>
+            </a:solidFill>
+            <a:tailEnd type="triangle"/>
+          </a:ln>
+        </p:spPr>
+        <p:style>
+          <a:lnRef idx="1">
+            <a:schemeClr val="accent1"/>
+          </a:lnRef>
+          <a:fillRef idx="0">
+            <a:schemeClr val="accent1"/>
+          </a:fillRef>
+          <a:effectRef idx="0">
+            <a:schemeClr val="accent1"/>
+          </a:effectRef>
+          <a:fontRef idx="minor">
+            <a:schemeClr val="tx1"/>
+          </a:fontRef>
+        </p:style>
+      </p:cxnSp>
+      <p:cxnSp>
+        <p:nvCxnSpPr>
+          <p:cNvPr id="16" name="Conector: angular 15">
+            <a:extLst>
+              <a:ext uri="{FF2B5EF4-FFF2-40B4-BE49-F238E27FC236}">
+                <a16:creationId xmlns:a16="http://schemas.microsoft.com/office/drawing/2014/main" id="{B9966494-4D06-4AE7-ABB8-0CE935E94E11}"/>
+              </a:ext>
+            </a:extLst>
+          </p:cNvPr>
+          <p:cNvCxnSpPr>
+            <a:stCxn id="9" idx="2"/>
+            <a:endCxn id="12" idx="0"/>
+          </p:cNvCxnSpPr>
+          <p:nvPr/>
+        </p:nvCxnSpPr>
+        <p:spPr>
+          <a:xfrm rot="5400000">
+            <a:off x="3322365" y="3656149"/>
+            <a:ext cx="1213815" cy="1258954"/>
+          </a:xfrm>
+          <a:prstGeom prst="bentConnector3">
+            <a:avLst/>
+          </a:prstGeom>
+          <a:ln w="76200">
+            <a:solidFill>
+              <a:schemeClr val="tx1">
+                <a:lumMod val="95000"/>
+                <a:lumOff val="5000"/>
+              </a:schemeClr>
+            </a:solidFill>
+            <a:tailEnd type="triangle"/>
+          </a:ln>
+        </p:spPr>
+        <p:style>
+          <a:lnRef idx="1">
+            <a:schemeClr val="accent1"/>
+          </a:lnRef>
+          <a:fillRef idx="0">
+            <a:schemeClr val="accent1"/>
+          </a:fillRef>
+          <a:effectRef idx="0">
+            <a:schemeClr val="accent1"/>
+          </a:effectRef>
+          <a:fontRef idx="minor">
+            <a:schemeClr val="tx1"/>
+          </a:fontRef>
+        </p:style>
+      </p:cxnSp>
+      <p:cxnSp>
+        <p:nvCxnSpPr>
+          <p:cNvPr id="18" name="Conector: angular 17">
+            <a:extLst>
+              <a:ext uri="{FF2B5EF4-FFF2-40B4-BE49-F238E27FC236}">
+                <a16:creationId xmlns:a16="http://schemas.microsoft.com/office/drawing/2014/main" id="{C6CC9C63-6552-440E-A512-A9181CECE137}"/>
+              </a:ext>
+            </a:extLst>
+          </p:cNvPr>
+          <p:cNvCxnSpPr>
+            <a:endCxn id="13" idx="0"/>
+          </p:cNvCxnSpPr>
+          <p:nvPr/>
+        </p:nvCxnSpPr>
+        <p:spPr>
+          <a:xfrm>
+            <a:off x="4558750" y="3813723"/>
+            <a:ext cx="2001077" cy="1078811"/>
+          </a:xfrm>
+          <a:prstGeom prst="bentConnector2">
+            <a:avLst/>
+          </a:prstGeom>
+          <a:ln w="76200">
+            <a:solidFill>
+              <a:schemeClr val="tx1">
+                <a:lumMod val="95000"/>
+                <a:lumOff val="5000"/>
+              </a:schemeClr>
+            </a:solidFill>
+            <a:tailEnd type="triangle"/>
+          </a:ln>
+        </p:spPr>
+        <p:style>
+          <a:lnRef idx="1">
+            <a:schemeClr val="accent1"/>
+          </a:lnRef>
+          <a:fillRef idx="0">
+            <a:schemeClr val="accent1"/>
+          </a:fillRef>
+          <a:effectRef idx="0">
+            <a:schemeClr val="accent1"/>
+          </a:effectRef>
+          <a:fontRef idx="minor">
+            <a:schemeClr val="tx1"/>
+          </a:fontRef>
+        </p:style>
+      </p:cxnSp>
+      <p:cxnSp>
+        <p:nvCxnSpPr>
+          <p:cNvPr id="24" name="Conector: angular 23">
+            <a:extLst>
+              <a:ext uri="{FF2B5EF4-FFF2-40B4-BE49-F238E27FC236}">
+                <a16:creationId xmlns:a16="http://schemas.microsoft.com/office/drawing/2014/main" id="{266AADAA-745D-449E-A250-11863A4F7FDE}"/>
+              </a:ext>
+            </a:extLst>
+          </p:cNvPr>
+          <p:cNvCxnSpPr>
+            <a:stCxn id="6" idx="2"/>
+            <a:endCxn id="11" idx="0"/>
+          </p:cNvCxnSpPr>
+          <p:nvPr/>
+        </p:nvCxnSpPr>
+        <p:spPr>
+          <a:xfrm rot="16200000" flipH="1">
+            <a:off x="7195310" y="994532"/>
+            <a:ext cx="1213815" cy="2484784"/>
+          </a:xfrm>
+          <a:prstGeom prst="bentConnector3">
+            <a:avLst/>
+          </a:prstGeom>
+          <a:ln w="76200">
+            <a:solidFill>
+              <a:schemeClr val="tx1">
+                <a:lumMod val="95000"/>
+                <a:lumOff val="5000"/>
+              </a:schemeClr>
+            </a:solidFill>
+            <a:tailEnd type="triangle"/>
+          </a:ln>
+        </p:spPr>
+        <p:style>
+          <a:lnRef idx="1">
+            <a:schemeClr val="accent1"/>
+          </a:lnRef>
+          <a:fillRef idx="0">
+            <a:schemeClr val="accent1"/>
+          </a:fillRef>
+          <a:effectRef idx="0">
+            <a:schemeClr val="accent1"/>
+          </a:effectRef>
+          <a:fontRef idx="minor">
+            <a:schemeClr val="tx1"/>
+          </a:fontRef>
+        </p:style>
+      </p:cxnSp>
+      <p:sp>
+        <p:nvSpPr>
+          <p:cNvPr id="26" name="CuadroTexto 25">
+            <a:extLst>
+              <a:ext uri="{FF2B5EF4-FFF2-40B4-BE49-F238E27FC236}">
+                <a16:creationId xmlns:a16="http://schemas.microsoft.com/office/drawing/2014/main" id="{598FDB93-A8D9-461D-9FB7-3986F10D1374}"/>
+              </a:ext>
+            </a:extLst>
+          </p:cNvPr>
+          <p:cNvSpPr txBox="1"/>
+          <p:nvPr/>
+        </p:nvSpPr>
+        <p:spPr>
+          <a:xfrm>
+            <a:off x="2305877" y="5786679"/>
+            <a:ext cx="2252871" cy="369332"/>
+          </a:xfrm>
+          <a:prstGeom prst="rect">
+            <a:avLst/>
+          </a:prstGeom>
+          <a:noFill/>
+        </p:spPr>
+        <p:txBody>
+          <a:bodyPr wrap="square" rtlCol="0">
+            <a:spAutoFit/>
+          </a:bodyPr>
+          <a:lstStyle/>
+          <a:p>
+            <a:r>
+              <a:rPr lang="es-MX" dirty="0" err="1"/>
+              <a:t>UnChecked</a:t>
+            </a:r>
+            <a:endParaRPr lang="es-MX" dirty="0"/>
+          </a:p>
+        </p:txBody>
+      </p:sp>
+      <p:sp>
+        <p:nvSpPr>
+          <p:cNvPr id="27" name="CuadroTexto 26">
+            <a:extLst>
+              <a:ext uri="{FF2B5EF4-FFF2-40B4-BE49-F238E27FC236}">
+                <a16:creationId xmlns:a16="http://schemas.microsoft.com/office/drawing/2014/main" id="{C32FCFF8-A0D3-4B34-AD5E-831AB8DE251A}"/>
+              </a:ext>
+            </a:extLst>
+          </p:cNvPr>
+          <p:cNvSpPr txBox="1"/>
+          <p:nvPr/>
+        </p:nvSpPr>
+        <p:spPr>
+          <a:xfrm>
+            <a:off x="5380383" y="5786679"/>
+            <a:ext cx="2252871" cy="369332"/>
+          </a:xfrm>
+          <a:prstGeom prst="rect">
+            <a:avLst/>
+          </a:prstGeom>
+          <a:noFill/>
+        </p:spPr>
+        <p:txBody>
+          <a:bodyPr wrap="square" rtlCol="0">
+            <a:spAutoFit/>
+          </a:bodyPr>
+          <a:lstStyle/>
+          <a:p>
+            <a:r>
+              <a:rPr lang="es-MX" dirty="0" err="1"/>
+              <a:t>Checked</a:t>
+            </a:r>
+            <a:endParaRPr lang="es-MX" dirty="0"/>
+          </a:p>
+        </p:txBody>
+      </p:sp>
+    </p:spTree>
+    <p:extLst>
+      <p:ext uri="{BB962C8B-B14F-4D97-AF65-F5344CB8AC3E}">
+        <p14:creationId xmlns:p14="http://schemas.microsoft.com/office/powerpoint/2010/main" val="1917612476"/>
+      </p:ext>
+    </p:extLst>
+  </p:cSld>
+  <p:clrMapOvr>
+    <a:masterClrMapping/>
+  </p:clrMapOvr>
+</p:sld>
+</file>
+
+<file path=ppt/slides/slide12.xml><?xml version="1.0" encoding="utf-8"?>
+<p:sld xmlns:a="http://schemas.openxmlformats.org/drawingml/2006/main" xmlns:r="http://schemas.openxmlformats.org/officeDocument/2006/relationships" xmlns:p="http://schemas.openxmlformats.org/presentationml/2006/main">
+  <p:cSld>
+    <p:spTree>
+      <p:nvGrpSpPr>
+        <p:cNvPr id="1" name=""/>
+        <p:cNvGrpSpPr/>
+        <p:nvPr/>
+      </p:nvGrpSpPr>
+      <p:grpSpPr>
+        <a:xfrm>
+          <a:off x="0" y="0"/>
+          <a:ext cx="0" cy="0"/>
+          <a:chOff x="0" y="0"/>
+          <a:chExt cx="0" cy="0"/>
+        </a:xfrm>
+      </p:grpSpPr>
+      <p:pic>
+        <p:nvPicPr>
+          <p:cNvPr id="10" name="Imagen 9">
+            <a:extLst>
+              <a:ext uri="{FF2B5EF4-FFF2-40B4-BE49-F238E27FC236}">
+                <a16:creationId xmlns:a16="http://schemas.microsoft.com/office/drawing/2014/main" id="{15B1CB55-DE9C-472F-9798-9D941F19E5AD}"/>
+              </a:ext>
+            </a:extLst>
+          </p:cNvPr>
+          <p:cNvPicPr>
+            <a:picLocks noChangeAspect="1"/>
+          </p:cNvPicPr>
+          <p:nvPr/>
+        </p:nvPicPr>
+        <p:blipFill>
+          <a:blip r:embed="rId2">
+            <a:extLst>
+              <a:ext uri="{28A0092B-C50C-407E-A947-70E740481C1C}">
+                <a14:useLocalDpi xmlns:a14="http://schemas.microsoft.com/office/drawing/2010/main" val="0"/>
+              </a:ext>
+            </a:extLst>
+          </a:blip>
+          <a:stretch>
+            <a:fillRect/>
+          </a:stretch>
+        </p:blipFill>
+        <p:spPr>
+          <a:xfrm>
+            <a:off x="0" y="0"/>
+            <a:ext cx="12192000" cy="6858000"/>
+          </a:xfrm>
+          <a:prstGeom prst="rect">
+            <a:avLst/>
+          </a:prstGeom>
+        </p:spPr>
+      </p:pic>
+      <p:sp>
+        <p:nvSpPr>
           <p:cNvPr id="2" name="Título 1">
             <a:extLst>
               <a:ext uri="{FF2B5EF4-FFF2-40B4-BE49-F238E27FC236}">
@@ -3891,21 +4517,39 @@
         </p:nvSpPr>
         <p:spPr>
           <a:xfrm>
-            <a:off x="2076408" y="3031283"/>
+            <a:off x="2076408" y="2794992"/>
             <a:ext cx="7822096" cy="1151076"/>
           </a:xfrm>
         </p:spPr>
         <p:txBody>
           <a:bodyPr>
-            <a:normAutofit fontScale="90000"/>
+            <a:normAutofit/>
           </a:bodyPr>
           <a:lstStyle/>
           <a:p>
+            <a:r>
+              <a:rPr lang="es-ES" b="1" dirty="0" err="1">
+                <a:latin typeface="Britannic Bold" panose="020B0903060703020204" pitchFamily="34" charset="0"/>
+              </a:rPr>
+              <a:t>Purposes</a:t>
+            </a:r>
             <a:r>
               <a:rPr lang="es-ES" b="1" dirty="0">
                 <a:latin typeface="Britannic Bold" panose="020B0903060703020204" pitchFamily="34" charset="0"/>
               </a:rPr>
-              <a:t>Asynchronous vs Synchronous</a:t>
+              <a:t> </a:t>
+            </a:r>
+            <a:r>
+              <a:rPr lang="es-ES" b="1" dirty="0" err="1">
+                <a:latin typeface="Britannic Bold" panose="020B0903060703020204" pitchFamily="34" charset="0"/>
+              </a:rPr>
+              <a:t>of</a:t>
+            </a:r>
+            <a:r>
+              <a:rPr lang="es-ES" b="1" dirty="0">
+                <a:latin typeface="Britannic Bold" panose="020B0903060703020204" pitchFamily="34" charset="0"/>
+              </a:rPr>
+              <a:t> final</a:t>
             </a:r>
             <a:endParaRPr lang="es-MX" dirty="0">
               <a:latin typeface="Britannic Bold" panose="020B0903060703020204" pitchFamily="34" charset="0"/>
@@ -4004,6 +4648,538 @@
     </p:spTree>
     <p:extLst>
       <p:ext uri="{BB962C8B-B14F-4D97-AF65-F5344CB8AC3E}">
+        <p14:creationId xmlns:p14="http://schemas.microsoft.com/office/powerpoint/2010/main" val="4133486506"/>
+      </p:ext>
+    </p:extLst>
+  </p:cSld>
+  <p:clrMapOvr>
+    <a:masterClrMapping/>
+  </p:clrMapOvr>
+</p:sld>
+</file>
+
+<file path=ppt/slides/slide13.xml><?xml version="1.0" encoding="utf-8"?>
+<p:sld xmlns:a="http://schemas.openxmlformats.org/drawingml/2006/main" xmlns:r="http://schemas.openxmlformats.org/officeDocument/2006/relationships" xmlns:p="http://schemas.openxmlformats.org/presentationml/2006/main">
+  <p:cSld>
+    <p:spTree>
+      <p:nvGrpSpPr>
+        <p:cNvPr id="1" name=""/>
+        <p:cNvGrpSpPr/>
+        <p:nvPr/>
+      </p:nvGrpSpPr>
+      <p:grpSpPr>
+        <a:xfrm>
+          <a:off x="0" y="0"/>
+          <a:ext cx="0" cy="0"/>
+          <a:chOff x="0" y="0"/>
+          <a:chExt cx="0" cy="0"/>
+        </a:xfrm>
+      </p:grpSpPr>
+      <p:pic>
+        <p:nvPicPr>
+          <p:cNvPr id="5" name="Imagen 4">
+            <a:extLst>
+              <a:ext uri="{FF2B5EF4-FFF2-40B4-BE49-F238E27FC236}">
+                <a16:creationId xmlns:a16="http://schemas.microsoft.com/office/drawing/2014/main" id="{9DCB142E-CE8A-4078-9E22-420A2F428246}"/>
+              </a:ext>
+            </a:extLst>
+          </p:cNvPr>
+          <p:cNvPicPr>
+            <a:picLocks noChangeAspect="1"/>
+          </p:cNvPicPr>
+          <p:nvPr/>
+        </p:nvPicPr>
+        <p:blipFill>
+          <a:blip r:embed="rId2"/>
+          <a:stretch>
+            <a:fillRect/>
+          </a:stretch>
+        </p:blipFill>
+        <p:spPr>
+          <a:xfrm>
+            <a:off x="0" y="0"/>
+            <a:ext cx="12192000" cy="6497640"/>
+          </a:xfrm>
+          <a:prstGeom prst="rect">
+            <a:avLst/>
+          </a:prstGeom>
+        </p:spPr>
+      </p:pic>
+    </p:spTree>
+    <p:extLst>
+      <p:ext uri="{BB962C8B-B14F-4D97-AF65-F5344CB8AC3E}">
+        <p14:creationId xmlns:p14="http://schemas.microsoft.com/office/powerpoint/2010/main" val="701483189"/>
+      </p:ext>
+    </p:extLst>
+  </p:cSld>
+  <p:clrMapOvr>
+    <a:masterClrMapping/>
+  </p:clrMapOvr>
+</p:sld>
+</file>
+
+<file path=ppt/slides/slide14.xml><?xml version="1.0" encoding="utf-8"?>
+<p:sld xmlns:a="http://schemas.openxmlformats.org/drawingml/2006/main" xmlns:r="http://schemas.openxmlformats.org/officeDocument/2006/relationships" xmlns:p="http://schemas.openxmlformats.org/presentationml/2006/main">
+  <p:cSld>
+    <p:spTree>
+      <p:nvGrpSpPr>
+        <p:cNvPr id="1" name=""/>
+        <p:cNvGrpSpPr/>
+        <p:nvPr/>
+      </p:nvGrpSpPr>
+      <p:grpSpPr>
+        <a:xfrm>
+          <a:off x="0" y="0"/>
+          <a:ext cx="0" cy="0"/>
+          <a:chOff x="0" y="0"/>
+          <a:chExt cx="0" cy="0"/>
+        </a:xfrm>
+      </p:grpSpPr>
+      <p:pic>
+        <p:nvPicPr>
+          <p:cNvPr id="10" name="Imagen 9">
+            <a:extLst>
+              <a:ext uri="{FF2B5EF4-FFF2-40B4-BE49-F238E27FC236}">
+                <a16:creationId xmlns:a16="http://schemas.microsoft.com/office/drawing/2014/main" id="{15B1CB55-DE9C-472F-9798-9D941F19E5AD}"/>
+              </a:ext>
+            </a:extLst>
+          </p:cNvPr>
+          <p:cNvPicPr>
+            <a:picLocks noChangeAspect="1"/>
+          </p:cNvPicPr>
+          <p:nvPr/>
+        </p:nvPicPr>
+        <p:blipFill>
+          <a:blip r:embed="rId2">
+            <a:extLst>
+              <a:ext uri="{28A0092B-C50C-407E-A947-70E740481C1C}">
+                <a14:useLocalDpi xmlns:a14="http://schemas.microsoft.com/office/drawing/2010/main" val="0"/>
+              </a:ext>
+            </a:extLst>
+          </a:blip>
+          <a:stretch>
+            <a:fillRect/>
+          </a:stretch>
+        </p:blipFill>
+        <p:spPr>
+          <a:xfrm>
+            <a:off x="0" y="0"/>
+            <a:ext cx="12192000" cy="6858000"/>
+          </a:xfrm>
+          <a:prstGeom prst="rect">
+            <a:avLst/>
+          </a:prstGeom>
+        </p:spPr>
+      </p:pic>
+      <p:sp>
+        <p:nvSpPr>
+          <p:cNvPr id="2" name="Título 1">
+            <a:extLst>
+              <a:ext uri="{FF2B5EF4-FFF2-40B4-BE49-F238E27FC236}">
+                <a16:creationId xmlns:a16="http://schemas.microsoft.com/office/drawing/2014/main" id="{A29E6CD6-FAAF-4EB2-937D-93C4B0F9CE35}"/>
+              </a:ext>
+            </a:extLst>
+          </p:cNvPr>
+          <p:cNvSpPr>
+            <a:spLocks noGrp="1"/>
+          </p:cNvSpPr>
+          <p:nvPr>
+            <p:ph type="ctrTitle"/>
+          </p:nvPr>
+        </p:nvSpPr>
+        <p:spPr>
+          <a:xfrm>
+            <a:off x="2076408" y="3031283"/>
+            <a:ext cx="7822096" cy="1151076"/>
+          </a:xfrm>
+        </p:spPr>
+        <p:txBody>
+          <a:bodyPr>
+            <a:normAutofit fontScale="90000"/>
+          </a:bodyPr>
+          <a:lstStyle/>
+          <a:p>
+            <a:r>
+              <a:rPr lang="es-ES" b="1" dirty="0" err="1">
+                <a:latin typeface="Britannic Bold" panose="020B0903060703020204" pitchFamily="34" charset="0"/>
+              </a:rPr>
+              <a:t>Multicatch</a:t>
+            </a:r>
+            <a:r>
+              <a:rPr lang="es-ES" b="1" dirty="0">
+                <a:latin typeface="Britannic Bold" panose="020B0903060703020204" pitchFamily="34" charset="0"/>
+              </a:rPr>
+              <a:t> and Try </a:t>
+            </a:r>
+            <a:r>
+              <a:rPr lang="es-ES" b="1" dirty="0" err="1">
+                <a:latin typeface="Britannic Bold" panose="020B0903060703020204" pitchFamily="34" charset="0"/>
+              </a:rPr>
+              <a:t>with</a:t>
+            </a:r>
+            <a:r>
+              <a:rPr lang="es-ES" b="1" dirty="0">
+                <a:latin typeface="Britannic Bold" panose="020B0903060703020204" pitchFamily="34" charset="0"/>
+              </a:rPr>
+              <a:t> </a:t>
+            </a:r>
+            <a:r>
+              <a:rPr lang="es-ES" b="1" dirty="0" err="1">
+                <a:latin typeface="Britannic Bold" panose="020B0903060703020204" pitchFamily="34" charset="0"/>
+              </a:rPr>
+              <a:t>resources</a:t>
+            </a:r>
+            <a:endParaRPr lang="es-MX" dirty="0">
+              <a:latin typeface="Britannic Bold" panose="020B0903060703020204" pitchFamily="34" charset="0"/>
+            </a:endParaRPr>
+          </a:p>
+        </p:txBody>
+      </p:sp>
+      <p:pic>
+        <p:nvPicPr>
+          <p:cNvPr id="5" name="Imagen 4">
+            <a:extLst>
+              <a:ext uri="{FF2B5EF4-FFF2-40B4-BE49-F238E27FC236}">
+                <a16:creationId xmlns:a16="http://schemas.microsoft.com/office/drawing/2014/main" id="{6B6F33BB-27E9-41F1-86E8-6C44F2753644}"/>
+              </a:ext>
+            </a:extLst>
+          </p:cNvPr>
+          <p:cNvPicPr>
+            <a:picLocks noChangeAspect="1"/>
+          </p:cNvPicPr>
+          <p:nvPr/>
+        </p:nvPicPr>
+        <p:blipFill rotWithShape="1">
+          <a:blip r:embed="rId3">
+            <a:extLst>
+              <a:ext uri="{BEBA8EAE-BF5A-486C-A8C5-ECC9F3942E4B}">
+                <a14:imgProps xmlns:a14="http://schemas.microsoft.com/office/drawing/2010/main">
+                  <a14:imgLayer r:embed="rId4">
+                    <a14:imgEffect>
+                      <a14:backgroundRemoval t="36750" b="67750" l="7750" r="94250">
+                        <a14:foregroundMark x1="21250" y1="53250" x2="21250" y2="53250"/>
+                        <a14:foregroundMark x1="29250" y1="50250" x2="29250" y2="50250"/>
+                        <a14:foregroundMark x1="29750" y1="43250" x2="29750" y2="43250"/>
+                        <a14:foregroundMark x1="49750" y1="52750" x2="49750" y2="52750"/>
+                        <a14:foregroundMark x1="63250" y1="50250" x2="63250" y2="50250"/>
+                        <a14:foregroundMark x1="75750" y1="48750" x2="75750" y2="48750"/>
+                        <a14:foregroundMark x1="85750" y1="48750" x2="85750" y2="48750"/>
+                      </a14:backgroundRemoval>
+                    </a14:imgEffect>
+                  </a14:imgLayer>
+                </a14:imgProps>
+              </a:ext>
+              <a:ext uri="{28A0092B-C50C-407E-A947-70E740481C1C}">
+                <a14:useLocalDpi xmlns:a14="http://schemas.microsoft.com/office/drawing/2010/main" val="0"/>
+              </a:ext>
+            </a:extLst>
+          </a:blip>
+          <a:srcRect l="7896" t="37372" r="6390" b="32811"/>
+          <a:stretch/>
+        </p:blipFill>
+        <p:spPr>
+          <a:xfrm>
+            <a:off x="2184952" y="245838"/>
+            <a:ext cx="2266122" cy="788298"/>
+          </a:xfrm>
+          <a:prstGeom prst="rect">
+            <a:avLst/>
+          </a:prstGeom>
+        </p:spPr>
+      </p:pic>
+      <p:pic>
+        <p:nvPicPr>
+          <p:cNvPr id="7" name="Imagen 6">
+            <a:extLst>
+              <a:ext uri="{FF2B5EF4-FFF2-40B4-BE49-F238E27FC236}">
+                <a16:creationId xmlns:a16="http://schemas.microsoft.com/office/drawing/2014/main" id="{E79F3D0A-E807-4A20-BB57-7BB046212A37}"/>
+              </a:ext>
+            </a:extLst>
+          </p:cNvPr>
+          <p:cNvPicPr>
+            <a:picLocks noChangeAspect="1"/>
+          </p:cNvPicPr>
+          <p:nvPr/>
+        </p:nvPicPr>
+        <p:blipFill>
+          <a:blip r:embed="rId5">
+            <a:extLst>
+              <a:ext uri="{28A0092B-C50C-407E-A947-70E740481C1C}">
+                <a14:useLocalDpi xmlns:a14="http://schemas.microsoft.com/office/drawing/2010/main" val="0"/>
+              </a:ext>
+            </a:extLst>
+          </a:blip>
+          <a:stretch>
+            <a:fillRect/>
+          </a:stretch>
+        </p:blipFill>
+        <p:spPr>
+          <a:xfrm>
+            <a:off x="8965157" y="9546"/>
+            <a:ext cx="933347" cy="1260881"/>
+          </a:xfrm>
+          <a:prstGeom prst="rect">
+            <a:avLst/>
+          </a:prstGeom>
+        </p:spPr>
+      </p:pic>
+    </p:spTree>
+    <p:extLst>
+      <p:ext uri="{BB962C8B-B14F-4D97-AF65-F5344CB8AC3E}">
+        <p14:creationId xmlns:p14="http://schemas.microsoft.com/office/powerpoint/2010/main" val="3195034610"/>
+      </p:ext>
+    </p:extLst>
+  </p:cSld>
+  <p:clrMapOvr>
+    <a:masterClrMapping/>
+  </p:clrMapOvr>
+</p:sld>
+</file>
+
+<file path=ppt/slides/slide15.xml><?xml version="1.0" encoding="utf-8"?>
+<p:sld xmlns:a="http://schemas.openxmlformats.org/drawingml/2006/main" xmlns:r="http://schemas.openxmlformats.org/officeDocument/2006/relationships" xmlns:p="http://schemas.openxmlformats.org/presentationml/2006/main">
+  <p:cSld>
+    <p:spTree>
+      <p:nvGrpSpPr>
+        <p:cNvPr id="1" name=""/>
+        <p:cNvGrpSpPr/>
+        <p:nvPr/>
+      </p:nvGrpSpPr>
+      <p:grpSpPr>
+        <a:xfrm>
+          <a:off x="0" y="0"/>
+          <a:ext cx="0" cy="0"/>
+          <a:chOff x="0" y="0"/>
+          <a:chExt cx="0" cy="0"/>
+        </a:xfrm>
+      </p:grpSpPr>
+      <p:pic>
+        <p:nvPicPr>
+          <p:cNvPr id="4" name="Imagen 3">
+            <a:extLst>
+              <a:ext uri="{FF2B5EF4-FFF2-40B4-BE49-F238E27FC236}">
+                <a16:creationId xmlns:a16="http://schemas.microsoft.com/office/drawing/2014/main" id="{5E5AD1B7-2754-49E1-9B5B-50BE4B5F45FE}"/>
+              </a:ext>
+            </a:extLst>
+          </p:cNvPr>
+          <p:cNvPicPr>
+            <a:picLocks noChangeAspect="1"/>
+          </p:cNvPicPr>
+          <p:nvPr/>
+        </p:nvPicPr>
+        <p:blipFill>
+          <a:blip r:embed="rId2"/>
+          <a:stretch>
+            <a:fillRect/>
+          </a:stretch>
+        </p:blipFill>
+        <p:spPr>
+          <a:xfrm>
+            <a:off x="0" y="0"/>
+            <a:ext cx="12192000" cy="6858000"/>
+          </a:xfrm>
+          <a:prstGeom prst="rect">
+            <a:avLst/>
+          </a:prstGeom>
+        </p:spPr>
+      </p:pic>
+    </p:spTree>
+    <p:extLst>
+      <p:ext uri="{BB962C8B-B14F-4D97-AF65-F5344CB8AC3E}">
+        <p14:creationId xmlns:p14="http://schemas.microsoft.com/office/powerpoint/2010/main" val="524348941"/>
+      </p:ext>
+    </p:extLst>
+  </p:cSld>
+  <p:clrMapOvr>
+    <a:masterClrMapping/>
+  </p:clrMapOvr>
+</p:sld>
+</file>
+
+<file path=ppt/slides/slide16.xml><?xml version="1.0" encoding="utf-8"?>
+<p:sld xmlns:a="http://schemas.openxmlformats.org/drawingml/2006/main" xmlns:r="http://schemas.openxmlformats.org/officeDocument/2006/relationships" xmlns:p="http://schemas.openxmlformats.org/presentationml/2006/main">
+  <p:cSld>
+    <p:spTree>
+      <p:nvGrpSpPr>
+        <p:cNvPr id="1" name=""/>
+        <p:cNvGrpSpPr/>
+        <p:nvPr/>
+      </p:nvGrpSpPr>
+      <p:grpSpPr>
+        <a:xfrm>
+          <a:off x="0" y="0"/>
+          <a:ext cx="0" cy="0"/>
+          <a:chOff x="0" y="0"/>
+          <a:chExt cx="0" cy="0"/>
+        </a:xfrm>
+      </p:grpSpPr>
+      <p:pic>
+        <p:nvPicPr>
+          <p:cNvPr id="10" name="Imagen 9">
+            <a:extLst>
+              <a:ext uri="{FF2B5EF4-FFF2-40B4-BE49-F238E27FC236}">
+                <a16:creationId xmlns:a16="http://schemas.microsoft.com/office/drawing/2014/main" id="{15B1CB55-DE9C-472F-9798-9D941F19E5AD}"/>
+              </a:ext>
+            </a:extLst>
+          </p:cNvPr>
+          <p:cNvPicPr>
+            <a:picLocks noChangeAspect="1"/>
+          </p:cNvPicPr>
+          <p:nvPr/>
+        </p:nvPicPr>
+        <p:blipFill>
+          <a:blip r:embed="rId2">
+            <a:extLst>
+              <a:ext uri="{28A0092B-C50C-407E-A947-70E740481C1C}">
+                <a14:useLocalDpi xmlns:a14="http://schemas.microsoft.com/office/drawing/2010/main" val="0"/>
+              </a:ext>
+            </a:extLst>
+          </a:blip>
+          <a:stretch>
+            <a:fillRect/>
+          </a:stretch>
+        </p:blipFill>
+        <p:spPr>
+          <a:xfrm>
+            <a:off x="0" y="0"/>
+            <a:ext cx="12192000" cy="6858000"/>
+          </a:xfrm>
+          <a:prstGeom prst="rect">
+            <a:avLst/>
+          </a:prstGeom>
+        </p:spPr>
+      </p:pic>
+      <p:sp>
+        <p:nvSpPr>
+          <p:cNvPr id="2" name="Título 1">
+            <a:extLst>
+              <a:ext uri="{FF2B5EF4-FFF2-40B4-BE49-F238E27FC236}">
+                <a16:creationId xmlns:a16="http://schemas.microsoft.com/office/drawing/2014/main" id="{A29E6CD6-FAAF-4EB2-937D-93C4B0F9CE35}"/>
+              </a:ext>
+            </a:extLst>
+          </p:cNvPr>
+          <p:cNvSpPr>
+            <a:spLocks noGrp="1"/>
+          </p:cNvSpPr>
+          <p:nvPr>
+            <p:ph type="ctrTitle"/>
+          </p:nvPr>
+        </p:nvSpPr>
+        <p:spPr>
+          <a:xfrm>
+            <a:off x="2076408" y="3031283"/>
+            <a:ext cx="7822096" cy="1151076"/>
+          </a:xfrm>
+        </p:spPr>
+        <p:txBody>
+          <a:bodyPr>
+            <a:normAutofit fontScale="90000"/>
+          </a:bodyPr>
+          <a:lstStyle/>
+          <a:p>
+            <a:r>
+              <a:rPr lang="es-ES" b="1" dirty="0">
+                <a:latin typeface="Britannic Bold" panose="020B0903060703020204" pitchFamily="34" charset="0"/>
+              </a:rPr>
+              <a:t>Asynchronous vs Synchronous</a:t>
+            </a:r>
+            <a:endParaRPr lang="es-MX" dirty="0">
+              <a:latin typeface="Britannic Bold" panose="020B0903060703020204" pitchFamily="34" charset="0"/>
+            </a:endParaRPr>
+          </a:p>
+        </p:txBody>
+      </p:sp>
+      <p:pic>
+        <p:nvPicPr>
+          <p:cNvPr id="5" name="Imagen 4">
+            <a:extLst>
+              <a:ext uri="{FF2B5EF4-FFF2-40B4-BE49-F238E27FC236}">
+                <a16:creationId xmlns:a16="http://schemas.microsoft.com/office/drawing/2014/main" id="{6B6F33BB-27E9-41F1-86E8-6C44F2753644}"/>
+              </a:ext>
+            </a:extLst>
+          </p:cNvPr>
+          <p:cNvPicPr>
+            <a:picLocks noChangeAspect="1"/>
+          </p:cNvPicPr>
+          <p:nvPr/>
+        </p:nvPicPr>
+        <p:blipFill rotWithShape="1">
+          <a:blip r:embed="rId3">
+            <a:extLst>
+              <a:ext uri="{BEBA8EAE-BF5A-486C-A8C5-ECC9F3942E4B}">
+                <a14:imgProps xmlns:a14="http://schemas.microsoft.com/office/drawing/2010/main">
+                  <a14:imgLayer r:embed="rId4">
+                    <a14:imgEffect>
+                      <a14:backgroundRemoval t="36750" b="67750" l="7750" r="94250">
+                        <a14:foregroundMark x1="21250" y1="53250" x2="21250" y2="53250"/>
+                        <a14:foregroundMark x1="29250" y1="50250" x2="29250" y2="50250"/>
+                        <a14:foregroundMark x1="29750" y1="43250" x2="29750" y2="43250"/>
+                        <a14:foregroundMark x1="49750" y1="52750" x2="49750" y2="52750"/>
+                        <a14:foregroundMark x1="63250" y1="50250" x2="63250" y2="50250"/>
+                        <a14:foregroundMark x1="75750" y1="48750" x2="75750" y2="48750"/>
+                        <a14:foregroundMark x1="85750" y1="48750" x2="85750" y2="48750"/>
+                      </a14:backgroundRemoval>
+                    </a14:imgEffect>
+                  </a14:imgLayer>
+                </a14:imgProps>
+              </a:ext>
+              <a:ext uri="{28A0092B-C50C-407E-A947-70E740481C1C}">
+                <a14:useLocalDpi xmlns:a14="http://schemas.microsoft.com/office/drawing/2010/main" val="0"/>
+              </a:ext>
+            </a:extLst>
+          </a:blip>
+          <a:srcRect l="7896" t="37372" r="6390" b="32811"/>
+          <a:stretch/>
+        </p:blipFill>
+        <p:spPr>
+          <a:xfrm>
+            <a:off x="2184952" y="245838"/>
+            <a:ext cx="2266122" cy="788298"/>
+          </a:xfrm>
+          <a:prstGeom prst="rect">
+            <a:avLst/>
+          </a:prstGeom>
+        </p:spPr>
+      </p:pic>
+      <p:pic>
+        <p:nvPicPr>
+          <p:cNvPr id="7" name="Imagen 6">
+            <a:extLst>
+              <a:ext uri="{FF2B5EF4-FFF2-40B4-BE49-F238E27FC236}">
+                <a16:creationId xmlns:a16="http://schemas.microsoft.com/office/drawing/2014/main" id="{E79F3D0A-E807-4A20-BB57-7BB046212A37}"/>
+              </a:ext>
+            </a:extLst>
+          </p:cNvPr>
+          <p:cNvPicPr>
+            <a:picLocks noChangeAspect="1"/>
+          </p:cNvPicPr>
+          <p:nvPr/>
+        </p:nvPicPr>
+        <p:blipFill>
+          <a:blip r:embed="rId5">
+            <a:extLst>
+              <a:ext uri="{28A0092B-C50C-407E-A947-70E740481C1C}">
+                <a14:useLocalDpi xmlns:a14="http://schemas.microsoft.com/office/drawing/2010/main" val="0"/>
+              </a:ext>
+            </a:extLst>
+          </a:blip>
+          <a:stretch>
+            <a:fillRect/>
+          </a:stretch>
+        </p:blipFill>
+        <p:spPr>
+          <a:xfrm>
+            <a:off x="8965157" y="9546"/>
+            <a:ext cx="933347" cy="1260881"/>
+          </a:xfrm>
+          <a:prstGeom prst="rect">
+            <a:avLst/>
+          </a:prstGeom>
+        </p:spPr>
+      </p:pic>
+    </p:spTree>
+    <p:extLst>
+      <p:ext uri="{BB962C8B-B14F-4D97-AF65-F5344CB8AC3E}">
         <p14:creationId xmlns:p14="http://schemas.microsoft.com/office/powerpoint/2010/main" val="2885140317"/>
       </p:ext>
     </p:extLst>
@@ -4014,7 +5190,7 @@
 </p:sld>
 </file>
 
-<file path=ppt/slides/slide12.xml><?xml version="1.0" encoding="utf-8"?>
+<file path=ppt/slides/slide17.xml><?xml version="1.0" encoding="utf-8"?>
 <p:sld xmlns:a="http://schemas.openxmlformats.org/drawingml/2006/main" xmlns:r="http://schemas.openxmlformats.org/officeDocument/2006/relationships" xmlns:p="http://schemas.openxmlformats.org/presentationml/2006/main">
   <p:cSld>
     <p:spTree>
@@ -5199,6 +6375,786 @@
       </p:grpSpPr>
       <p:pic>
         <p:nvPicPr>
+          <p:cNvPr id="7" name="Imagen 6">
+            <a:extLst>
+              <a:ext uri="{FF2B5EF4-FFF2-40B4-BE49-F238E27FC236}">
+                <a16:creationId xmlns:a16="http://schemas.microsoft.com/office/drawing/2014/main" id="{28ABCDB1-D408-4E04-BC11-C8A84D49B60A}"/>
+              </a:ext>
+            </a:extLst>
+          </p:cNvPr>
+          <p:cNvPicPr>
+            <a:picLocks noChangeAspect="1"/>
+          </p:cNvPicPr>
+          <p:nvPr/>
+        </p:nvPicPr>
+        <p:blipFill>
+          <a:blip r:embed="rId2">
+            <a:extLst>
+              <a:ext uri="{28A0092B-C50C-407E-A947-70E740481C1C}">
+                <a14:useLocalDpi xmlns:a14="http://schemas.microsoft.com/office/drawing/2010/main" val="0"/>
+              </a:ext>
+            </a:extLst>
+          </a:blip>
+          <a:stretch>
+            <a:fillRect/>
+          </a:stretch>
+        </p:blipFill>
+        <p:spPr>
+          <a:xfrm>
+            <a:off x="0" y="-16850"/>
+            <a:ext cx="12192000" cy="6874850"/>
+          </a:xfrm>
+          <a:prstGeom prst="rect">
+            <a:avLst/>
+          </a:prstGeom>
+        </p:spPr>
+      </p:pic>
+    </p:spTree>
+    <p:extLst>
+      <p:ext uri="{BB962C8B-B14F-4D97-AF65-F5344CB8AC3E}">
+        <p14:creationId xmlns:p14="http://schemas.microsoft.com/office/powerpoint/2010/main" val="4172987983"/>
+      </p:ext>
+    </p:extLst>
+  </p:cSld>
+  <p:clrMapOvr>
+    <a:masterClrMapping/>
+  </p:clrMapOvr>
+</p:sld>
+</file>
+
+<file path=ppt/slides/slide4.xml><?xml version="1.0" encoding="utf-8"?>
+<p:sld xmlns:a="http://schemas.openxmlformats.org/drawingml/2006/main" xmlns:r="http://schemas.openxmlformats.org/officeDocument/2006/relationships" xmlns:p="http://schemas.openxmlformats.org/presentationml/2006/main">
+  <p:cSld>
+    <p:spTree>
+      <p:nvGrpSpPr>
+        <p:cNvPr id="1" name=""/>
+        <p:cNvGrpSpPr/>
+        <p:nvPr/>
+      </p:nvGrpSpPr>
+      <p:grpSpPr>
+        <a:xfrm>
+          <a:off x="0" y="0"/>
+          <a:ext cx="0" cy="0"/>
+          <a:chOff x="0" y="0"/>
+          <a:chExt cx="0" cy="0"/>
+        </a:xfrm>
+      </p:grpSpPr>
+      <p:pic>
+        <p:nvPicPr>
+          <p:cNvPr id="4" name="Imagen 3">
+            <a:extLst>
+              <a:ext uri="{FF2B5EF4-FFF2-40B4-BE49-F238E27FC236}">
+                <a16:creationId xmlns:a16="http://schemas.microsoft.com/office/drawing/2014/main" id="{9352625A-F966-44F2-A6A6-994009D29838}"/>
+              </a:ext>
+            </a:extLst>
+          </p:cNvPr>
+          <p:cNvPicPr>
+            <a:picLocks noChangeAspect="1"/>
+          </p:cNvPicPr>
+          <p:nvPr/>
+        </p:nvPicPr>
+        <p:blipFill>
+          <a:blip r:embed="rId2">
+            <a:extLst>
+              <a:ext uri="{28A0092B-C50C-407E-A947-70E740481C1C}">
+                <a14:useLocalDpi xmlns:a14="http://schemas.microsoft.com/office/drawing/2010/main" val="0"/>
+              </a:ext>
+            </a:extLst>
+          </a:blip>
+          <a:stretch>
+            <a:fillRect/>
+          </a:stretch>
+        </p:blipFill>
+        <p:spPr>
+          <a:xfrm>
+            <a:off x="0" y="0"/>
+            <a:ext cx="12192000" cy="6858000"/>
+          </a:xfrm>
+          <a:prstGeom prst="rect">
+            <a:avLst/>
+          </a:prstGeom>
+        </p:spPr>
+      </p:pic>
+      <p:pic>
+        <p:nvPicPr>
+          <p:cNvPr id="6" name="Imagen 5">
+            <a:extLst>
+              <a:ext uri="{FF2B5EF4-FFF2-40B4-BE49-F238E27FC236}">
+                <a16:creationId xmlns:a16="http://schemas.microsoft.com/office/drawing/2014/main" id="{BB34D1B8-CC7B-4513-B356-1E95CE58E95B}"/>
+              </a:ext>
+            </a:extLst>
+          </p:cNvPr>
+          <p:cNvPicPr>
+            <a:picLocks noChangeAspect="1"/>
+          </p:cNvPicPr>
+          <p:nvPr/>
+        </p:nvPicPr>
+        <p:blipFill>
+          <a:blip r:embed="rId3">
+            <a:extLst>
+              <a:ext uri="{28A0092B-C50C-407E-A947-70E740481C1C}">
+                <a14:useLocalDpi xmlns:a14="http://schemas.microsoft.com/office/drawing/2010/main" val="0"/>
+              </a:ext>
+            </a:extLst>
+          </a:blip>
+          <a:stretch>
+            <a:fillRect/>
+          </a:stretch>
+        </p:blipFill>
+        <p:spPr>
+          <a:xfrm>
+            <a:off x="5087385" y="3843130"/>
+            <a:ext cx="1932953" cy="1932953"/>
+          </a:xfrm>
+          <a:prstGeom prst="rect">
+            <a:avLst/>
+          </a:prstGeom>
+        </p:spPr>
+      </p:pic>
+      <p:pic>
+        <p:nvPicPr>
+          <p:cNvPr id="7" name="Imagen 6">
+            <a:extLst>
+              <a:ext uri="{FF2B5EF4-FFF2-40B4-BE49-F238E27FC236}">
+                <a16:creationId xmlns:a16="http://schemas.microsoft.com/office/drawing/2014/main" id="{D24F2968-C1E2-459E-AD5D-BBEB3CC29534}"/>
+              </a:ext>
+            </a:extLst>
+          </p:cNvPr>
+          <p:cNvPicPr>
+            <a:picLocks noChangeAspect="1"/>
+          </p:cNvPicPr>
+          <p:nvPr/>
+        </p:nvPicPr>
+        <p:blipFill>
+          <a:blip r:embed="rId3">
+            <a:extLst>
+              <a:ext uri="{28A0092B-C50C-407E-A947-70E740481C1C}">
+                <a14:useLocalDpi xmlns:a14="http://schemas.microsoft.com/office/drawing/2010/main" val="0"/>
+              </a:ext>
+            </a:extLst>
+          </a:blip>
+          <a:stretch>
+            <a:fillRect/>
+          </a:stretch>
+        </p:blipFill>
+        <p:spPr>
+          <a:xfrm>
+            <a:off x="7837211" y="3843130"/>
+            <a:ext cx="1932953" cy="1932953"/>
+          </a:xfrm>
+          <a:prstGeom prst="rect">
+            <a:avLst/>
+          </a:prstGeom>
+        </p:spPr>
+      </p:pic>
+      <p:pic>
+        <p:nvPicPr>
+          <p:cNvPr id="9" name="Imagen 8">
+            <a:extLst>
+              <a:ext uri="{FF2B5EF4-FFF2-40B4-BE49-F238E27FC236}">
+                <a16:creationId xmlns:a16="http://schemas.microsoft.com/office/drawing/2014/main" id="{018B5FA4-FE0E-4109-B4D5-B01899423E16}"/>
+              </a:ext>
+            </a:extLst>
+          </p:cNvPr>
+          <p:cNvPicPr>
+            <a:picLocks noChangeAspect="1"/>
+          </p:cNvPicPr>
+          <p:nvPr/>
+        </p:nvPicPr>
+        <p:blipFill>
+          <a:blip r:embed="rId4">
+            <a:extLst>
+              <a:ext uri="{28A0092B-C50C-407E-A947-70E740481C1C}">
+                <a14:useLocalDpi xmlns:a14="http://schemas.microsoft.com/office/drawing/2010/main" val="0"/>
+              </a:ext>
+            </a:extLst>
+          </a:blip>
+          <a:stretch>
+            <a:fillRect/>
+          </a:stretch>
+        </p:blipFill>
+        <p:spPr>
+          <a:xfrm>
+            <a:off x="5531179" y="5142776"/>
+            <a:ext cx="1174266" cy="1174266"/>
+          </a:xfrm>
+          <a:prstGeom prst="rect">
+            <a:avLst/>
+          </a:prstGeom>
+        </p:spPr>
+      </p:pic>
+      <p:pic>
+        <p:nvPicPr>
+          <p:cNvPr id="11" name="Imagen 10">
+            <a:extLst>
+              <a:ext uri="{FF2B5EF4-FFF2-40B4-BE49-F238E27FC236}">
+                <a16:creationId xmlns:a16="http://schemas.microsoft.com/office/drawing/2014/main" id="{015E088A-0299-40B0-90B0-398E95FC55EB}"/>
+              </a:ext>
+            </a:extLst>
+          </p:cNvPr>
+          <p:cNvPicPr>
+            <a:picLocks noChangeAspect="1"/>
+          </p:cNvPicPr>
+          <p:nvPr/>
+        </p:nvPicPr>
+        <p:blipFill>
+          <a:blip r:embed="rId5">
+            <a:extLst>
+              <a:ext uri="{28A0092B-C50C-407E-A947-70E740481C1C}">
+                <a14:useLocalDpi xmlns:a14="http://schemas.microsoft.com/office/drawing/2010/main" val="0"/>
+              </a:ext>
+            </a:extLst>
+          </a:blip>
+          <a:stretch>
+            <a:fillRect/>
+          </a:stretch>
+        </p:blipFill>
+        <p:spPr>
+          <a:xfrm>
+            <a:off x="8109604" y="4979088"/>
+            <a:ext cx="1388165" cy="1388165"/>
+          </a:xfrm>
+          <a:prstGeom prst="rect">
+            <a:avLst/>
+          </a:prstGeom>
+        </p:spPr>
+      </p:pic>
+      <p:pic>
+        <p:nvPicPr>
+          <p:cNvPr id="12" name="Imagen 11">
+            <a:extLst>
+              <a:ext uri="{FF2B5EF4-FFF2-40B4-BE49-F238E27FC236}">
+                <a16:creationId xmlns:a16="http://schemas.microsoft.com/office/drawing/2014/main" id="{C5E0EFE0-D5E3-4C72-B69D-B18E6BFB70B9}"/>
+              </a:ext>
+            </a:extLst>
+          </p:cNvPr>
+          <p:cNvPicPr>
+            <a:picLocks noChangeAspect="1"/>
+          </p:cNvPicPr>
+          <p:nvPr/>
+        </p:nvPicPr>
+        <p:blipFill>
+          <a:blip r:embed="rId3">
+            <a:extLst>
+              <a:ext uri="{28A0092B-C50C-407E-A947-70E740481C1C}">
+                <a14:useLocalDpi xmlns:a14="http://schemas.microsoft.com/office/drawing/2010/main" val="0"/>
+              </a:ext>
+            </a:extLst>
+          </a:blip>
+          <a:stretch>
+            <a:fillRect/>
+          </a:stretch>
+        </p:blipFill>
+        <p:spPr>
+          <a:xfrm>
+            <a:off x="7837209" y="582163"/>
+            <a:ext cx="1932953" cy="1932953"/>
+          </a:xfrm>
+          <a:prstGeom prst="rect">
+            <a:avLst/>
+          </a:prstGeom>
+        </p:spPr>
+      </p:pic>
+      <p:pic>
+        <p:nvPicPr>
+          <p:cNvPr id="14" name="Imagen 13">
+            <a:extLst>
+              <a:ext uri="{FF2B5EF4-FFF2-40B4-BE49-F238E27FC236}">
+                <a16:creationId xmlns:a16="http://schemas.microsoft.com/office/drawing/2014/main" id="{9FF8CB32-76F0-40D4-B933-AAC43333A0DB}"/>
+              </a:ext>
+            </a:extLst>
+          </p:cNvPr>
+          <p:cNvPicPr>
+            <a:picLocks noChangeAspect="1"/>
+          </p:cNvPicPr>
+          <p:nvPr/>
+        </p:nvPicPr>
+        <p:blipFill>
+          <a:blip r:embed="rId6">
+            <a:extLst>
+              <a:ext uri="{28A0092B-C50C-407E-A947-70E740481C1C}">
+                <a14:useLocalDpi xmlns:a14="http://schemas.microsoft.com/office/drawing/2010/main" val="0"/>
+              </a:ext>
+            </a:extLst>
+          </a:blip>
+          <a:stretch>
+            <a:fillRect/>
+          </a:stretch>
+        </p:blipFill>
+        <p:spPr>
+          <a:xfrm>
+            <a:off x="5101144" y="582163"/>
+            <a:ext cx="1905434" cy="1905434"/>
+          </a:xfrm>
+          <a:prstGeom prst="rect">
+            <a:avLst/>
+          </a:prstGeom>
+        </p:spPr>
+      </p:pic>
+      <p:pic>
+        <p:nvPicPr>
+          <p:cNvPr id="16" name="Imagen 15">
+            <a:extLst>
+              <a:ext uri="{FF2B5EF4-FFF2-40B4-BE49-F238E27FC236}">
+                <a16:creationId xmlns:a16="http://schemas.microsoft.com/office/drawing/2014/main" id="{058789B4-7EE8-41E7-8D80-700890618206}"/>
+              </a:ext>
+            </a:extLst>
+          </p:cNvPr>
+          <p:cNvPicPr>
+            <a:picLocks noChangeAspect="1"/>
+          </p:cNvPicPr>
+          <p:nvPr/>
+        </p:nvPicPr>
+        <p:blipFill>
+          <a:blip r:embed="rId7">
+            <a:extLst>
+              <a:ext uri="{28A0092B-C50C-407E-A947-70E740481C1C}">
+                <a14:useLocalDpi xmlns:a14="http://schemas.microsoft.com/office/drawing/2010/main" val="0"/>
+              </a:ext>
+            </a:extLst>
+          </a:blip>
+          <a:stretch>
+            <a:fillRect/>
+          </a:stretch>
+        </p:blipFill>
+        <p:spPr>
+          <a:xfrm>
+            <a:off x="1873528" y="743547"/>
+            <a:ext cx="1932953" cy="1932953"/>
+          </a:xfrm>
+          <a:prstGeom prst="rect">
+            <a:avLst/>
+          </a:prstGeom>
+        </p:spPr>
+      </p:pic>
+      <p:pic>
+        <p:nvPicPr>
+          <p:cNvPr id="18" name="Imagen 17">
+            <a:extLst>
+              <a:ext uri="{FF2B5EF4-FFF2-40B4-BE49-F238E27FC236}">
+                <a16:creationId xmlns:a16="http://schemas.microsoft.com/office/drawing/2014/main" id="{89FE38D3-B36E-4868-802A-07FBA3458D98}"/>
+              </a:ext>
+            </a:extLst>
+          </p:cNvPr>
+          <p:cNvPicPr>
+            <a:picLocks noChangeAspect="1"/>
+          </p:cNvPicPr>
+          <p:nvPr/>
+        </p:nvPicPr>
+        <p:blipFill>
+          <a:blip r:embed="rId8">
+            <a:extLst>
+              <a:ext uri="{28A0092B-C50C-407E-A947-70E740481C1C}">
+                <a14:useLocalDpi xmlns:a14="http://schemas.microsoft.com/office/drawing/2010/main" val="0"/>
+              </a:ext>
+            </a:extLst>
+          </a:blip>
+          <a:stretch>
+            <a:fillRect/>
+          </a:stretch>
+        </p:blipFill>
+        <p:spPr>
+          <a:xfrm>
+            <a:off x="1813632" y="4054746"/>
+            <a:ext cx="1848684" cy="1848684"/>
+          </a:xfrm>
+          <a:prstGeom prst="rect">
+            <a:avLst/>
+          </a:prstGeom>
+        </p:spPr>
+      </p:pic>
+      <p:cxnSp>
+        <p:nvCxnSpPr>
+          <p:cNvPr id="20" name="Conector recto de flecha 19">
+            <a:extLst>
+              <a:ext uri="{FF2B5EF4-FFF2-40B4-BE49-F238E27FC236}">
+                <a16:creationId xmlns:a16="http://schemas.microsoft.com/office/drawing/2014/main" id="{DC3E2D95-E755-45D1-8058-13039EBE696C}"/>
+              </a:ext>
+            </a:extLst>
+          </p:cNvPr>
+          <p:cNvCxnSpPr>
+            <a:cxnSpLocks/>
+          </p:cNvCxnSpPr>
+          <p:nvPr/>
+        </p:nvCxnSpPr>
+        <p:spPr>
+          <a:xfrm flipH="1" flipV="1">
+            <a:off x="2836949" y="2676501"/>
+            <a:ext cx="3055" cy="1390041"/>
+          </a:xfrm>
+          <a:prstGeom prst="straightConnector1">
+            <a:avLst/>
+          </a:prstGeom>
+          <a:ln w="76200">
+            <a:tailEnd type="triangle"/>
+          </a:ln>
+        </p:spPr>
+        <p:style>
+          <a:lnRef idx="1">
+            <a:schemeClr val="accent1"/>
+          </a:lnRef>
+          <a:fillRef idx="0">
+            <a:schemeClr val="accent1"/>
+          </a:fillRef>
+          <a:effectRef idx="0">
+            <a:schemeClr val="accent1"/>
+          </a:effectRef>
+          <a:fontRef idx="minor">
+            <a:schemeClr val="tx1"/>
+          </a:fontRef>
+        </p:style>
+      </p:cxnSp>
+      <p:cxnSp>
+        <p:nvCxnSpPr>
+          <p:cNvPr id="23" name="Conector recto de flecha 22">
+            <a:extLst>
+              <a:ext uri="{FF2B5EF4-FFF2-40B4-BE49-F238E27FC236}">
+                <a16:creationId xmlns:a16="http://schemas.microsoft.com/office/drawing/2014/main" id="{563BCDD2-ED53-4114-BBD3-E573955F6046}"/>
+              </a:ext>
+            </a:extLst>
+          </p:cNvPr>
+          <p:cNvCxnSpPr>
+            <a:stCxn id="16" idx="3"/>
+          </p:cNvCxnSpPr>
+          <p:nvPr/>
+        </p:nvCxnSpPr>
+        <p:spPr>
+          <a:xfrm flipV="1">
+            <a:off x="3806481" y="1710023"/>
+            <a:ext cx="1280904" cy="1"/>
+          </a:xfrm>
+          <a:prstGeom prst="straightConnector1">
+            <a:avLst/>
+          </a:prstGeom>
+          <a:ln w="76200">
+            <a:tailEnd type="triangle"/>
+          </a:ln>
+        </p:spPr>
+        <p:style>
+          <a:lnRef idx="1">
+            <a:schemeClr val="accent1"/>
+          </a:lnRef>
+          <a:fillRef idx="0">
+            <a:schemeClr val="accent1"/>
+          </a:fillRef>
+          <a:effectRef idx="0">
+            <a:schemeClr val="accent1"/>
+          </a:effectRef>
+          <a:fontRef idx="minor">
+            <a:schemeClr val="tx1"/>
+          </a:fontRef>
+        </p:style>
+      </p:cxnSp>
+      <p:cxnSp>
+        <p:nvCxnSpPr>
+          <p:cNvPr id="25" name="Conector recto de flecha 24">
+            <a:extLst>
+              <a:ext uri="{FF2B5EF4-FFF2-40B4-BE49-F238E27FC236}">
+                <a16:creationId xmlns:a16="http://schemas.microsoft.com/office/drawing/2014/main" id="{CB67DC2B-BE66-4E38-AB70-2BA206D9B119}"/>
+              </a:ext>
+            </a:extLst>
+          </p:cNvPr>
+          <p:cNvCxnSpPr>
+            <a:cxnSpLocks/>
+          </p:cNvCxnSpPr>
+          <p:nvPr/>
+        </p:nvCxnSpPr>
+        <p:spPr>
+          <a:xfrm>
+            <a:off x="7020338" y="1681146"/>
+            <a:ext cx="830633" cy="0"/>
+          </a:xfrm>
+          <a:prstGeom prst="straightConnector1">
+            <a:avLst/>
+          </a:prstGeom>
+          <a:ln w="76200">
+            <a:tailEnd type="triangle"/>
+          </a:ln>
+        </p:spPr>
+        <p:style>
+          <a:lnRef idx="1">
+            <a:schemeClr val="accent1"/>
+          </a:lnRef>
+          <a:fillRef idx="0">
+            <a:schemeClr val="accent1"/>
+          </a:fillRef>
+          <a:effectRef idx="0">
+            <a:schemeClr val="accent1"/>
+          </a:effectRef>
+          <a:fontRef idx="minor">
+            <a:schemeClr val="tx1"/>
+          </a:fontRef>
+        </p:style>
+      </p:cxnSp>
+      <p:cxnSp>
+        <p:nvCxnSpPr>
+          <p:cNvPr id="27" name="Conector recto de flecha 26">
+            <a:extLst>
+              <a:ext uri="{FF2B5EF4-FFF2-40B4-BE49-F238E27FC236}">
+                <a16:creationId xmlns:a16="http://schemas.microsoft.com/office/drawing/2014/main" id="{55A8FCFA-EDC2-444B-A8EB-926E0155DFEF}"/>
+              </a:ext>
+            </a:extLst>
+          </p:cNvPr>
+          <p:cNvCxnSpPr/>
+          <p:nvPr/>
+        </p:nvCxnSpPr>
+        <p:spPr>
+          <a:xfrm flipH="1">
+            <a:off x="6118312" y="2305878"/>
+            <a:ext cx="1846245" cy="1537252"/>
+          </a:xfrm>
+          <a:prstGeom prst="straightConnector1">
+            <a:avLst/>
+          </a:prstGeom>
+          <a:ln w="76200">
+            <a:tailEnd type="triangle"/>
+          </a:ln>
+        </p:spPr>
+        <p:style>
+          <a:lnRef idx="1">
+            <a:schemeClr val="accent1"/>
+          </a:lnRef>
+          <a:fillRef idx="0">
+            <a:schemeClr val="accent1"/>
+          </a:fillRef>
+          <a:effectRef idx="0">
+            <a:schemeClr val="accent1"/>
+          </a:effectRef>
+          <a:fontRef idx="minor">
+            <a:schemeClr val="tx1"/>
+          </a:fontRef>
+        </p:style>
+      </p:cxnSp>
+      <p:cxnSp>
+        <p:nvCxnSpPr>
+          <p:cNvPr id="31" name="Conector recto de flecha 30">
+            <a:extLst>
+              <a:ext uri="{FF2B5EF4-FFF2-40B4-BE49-F238E27FC236}">
+                <a16:creationId xmlns:a16="http://schemas.microsoft.com/office/drawing/2014/main" id="{F421B691-EF9D-4D85-A5BD-9B9EFCD5C811}"/>
+              </a:ext>
+            </a:extLst>
+          </p:cNvPr>
+          <p:cNvCxnSpPr>
+            <a:stCxn id="12" idx="2"/>
+            <a:endCxn id="7" idx="0"/>
+          </p:cNvCxnSpPr>
+          <p:nvPr/>
+        </p:nvCxnSpPr>
+        <p:spPr>
+          <a:xfrm>
+            <a:off x="8803686" y="2515116"/>
+            <a:ext cx="2" cy="1328014"/>
+          </a:xfrm>
+          <a:prstGeom prst="straightConnector1">
+            <a:avLst/>
+          </a:prstGeom>
+          <a:ln w="76200">
+            <a:tailEnd type="triangle"/>
+          </a:ln>
+        </p:spPr>
+        <p:style>
+          <a:lnRef idx="1">
+            <a:schemeClr val="accent1"/>
+          </a:lnRef>
+          <a:fillRef idx="0">
+            <a:schemeClr val="accent1"/>
+          </a:fillRef>
+          <a:effectRef idx="0">
+            <a:schemeClr val="accent1"/>
+          </a:effectRef>
+          <a:fontRef idx="minor">
+            <a:schemeClr val="tx1"/>
+          </a:fontRef>
+        </p:style>
+      </p:cxnSp>
+      <p:sp>
+        <p:nvSpPr>
+          <p:cNvPr id="33" name="Rombo 32">
+            <a:extLst>
+              <a:ext uri="{FF2B5EF4-FFF2-40B4-BE49-F238E27FC236}">
+                <a16:creationId xmlns:a16="http://schemas.microsoft.com/office/drawing/2014/main" id="{8A039024-1ADD-41CE-AA34-BA7BE2A36BCB}"/>
+              </a:ext>
+            </a:extLst>
+          </p:cNvPr>
+          <p:cNvSpPr/>
+          <p:nvPr/>
+        </p:nvSpPr>
+        <p:spPr>
+          <a:xfrm>
+            <a:off x="2593843" y="2569084"/>
+            <a:ext cx="486211" cy="610039"/>
+          </a:xfrm>
+          <a:prstGeom prst="diamond">
+            <a:avLst/>
+          </a:prstGeom>
+        </p:spPr>
+        <p:style>
+          <a:lnRef idx="2">
+            <a:schemeClr val="accent1">
+              <a:shade val="50000"/>
+            </a:schemeClr>
+          </a:lnRef>
+          <a:fillRef idx="1">
+            <a:schemeClr val="accent1"/>
+          </a:fillRef>
+          <a:effectRef idx="0">
+            <a:schemeClr val="accent1"/>
+          </a:effectRef>
+          <a:fontRef idx="minor">
+            <a:schemeClr val="lt1"/>
+          </a:fontRef>
+        </p:style>
+        <p:txBody>
+          <a:bodyPr rtlCol="0" anchor="ctr"/>
+          <a:lstStyle/>
+          <a:p>
+            <a:pPr algn="ctr"/>
+            <a:endParaRPr lang="es-MX"/>
+          </a:p>
+        </p:txBody>
+      </p:sp>
+    </p:spTree>
+    <p:extLst>
+      <p:ext uri="{BB962C8B-B14F-4D97-AF65-F5344CB8AC3E}">
+        <p14:creationId xmlns:p14="http://schemas.microsoft.com/office/powerpoint/2010/main" val="2567399030"/>
+      </p:ext>
+    </p:extLst>
+  </p:cSld>
+  <p:clrMapOvr>
+    <a:masterClrMapping/>
+  </p:clrMapOvr>
+</p:sld>
+</file>
+
+<file path=ppt/slides/slide5.xml><?xml version="1.0" encoding="utf-8"?>
+<p:sld xmlns:a="http://schemas.openxmlformats.org/drawingml/2006/main" xmlns:r="http://schemas.openxmlformats.org/officeDocument/2006/relationships" xmlns:p="http://schemas.openxmlformats.org/presentationml/2006/main">
+  <p:cSld>
+    <p:spTree>
+      <p:nvGrpSpPr>
+        <p:cNvPr id="1" name=""/>
+        <p:cNvGrpSpPr/>
+        <p:nvPr/>
+      </p:nvGrpSpPr>
+      <p:grpSpPr>
+        <a:xfrm>
+          <a:off x="0" y="0"/>
+          <a:ext cx="0" cy="0"/>
+          <a:chOff x="0" y="0"/>
+          <a:chExt cx="0" cy="0"/>
+        </a:xfrm>
+      </p:grpSpPr>
+      <p:sp>
+        <p:nvSpPr>
+          <p:cNvPr id="2" name="Título 1">
+            <a:extLst>
+              <a:ext uri="{FF2B5EF4-FFF2-40B4-BE49-F238E27FC236}">
+                <a16:creationId xmlns:a16="http://schemas.microsoft.com/office/drawing/2014/main" id="{A9A0FB85-8042-474A-BA2C-78D91DCA02D9}"/>
+              </a:ext>
+            </a:extLst>
+          </p:cNvPr>
+          <p:cNvSpPr>
+            <a:spLocks noGrp="1"/>
+          </p:cNvSpPr>
+          <p:nvPr>
+            <p:ph type="title"/>
+          </p:nvPr>
+        </p:nvSpPr>
+        <p:spPr/>
+        <p:txBody>
+          <a:bodyPr/>
+          <a:lstStyle/>
+          <a:p>
+            <a:endParaRPr lang="es-MX"/>
+          </a:p>
+        </p:txBody>
+      </p:sp>
+      <p:sp>
+        <p:nvSpPr>
+          <p:cNvPr id="3" name="Marcador de contenido 2">
+            <a:extLst>
+              <a:ext uri="{FF2B5EF4-FFF2-40B4-BE49-F238E27FC236}">
+                <a16:creationId xmlns:a16="http://schemas.microsoft.com/office/drawing/2014/main" id="{11D5C4E1-8763-4CB7-8AA0-7BC573619554}"/>
+              </a:ext>
+            </a:extLst>
+          </p:cNvPr>
+          <p:cNvSpPr>
+            <a:spLocks noGrp="1"/>
+          </p:cNvSpPr>
+          <p:nvPr>
+            <p:ph idx="1"/>
+          </p:nvPr>
+        </p:nvSpPr>
+        <p:spPr/>
+        <p:txBody>
+          <a:bodyPr/>
+          <a:lstStyle/>
+          <a:p>
+            <a:endParaRPr lang="es-MX"/>
+          </a:p>
+        </p:txBody>
+      </p:sp>
+      <p:pic>
+        <p:nvPicPr>
+          <p:cNvPr id="4" name="Imagen 3">
+            <a:extLst>
+              <a:ext uri="{FF2B5EF4-FFF2-40B4-BE49-F238E27FC236}">
+                <a16:creationId xmlns:a16="http://schemas.microsoft.com/office/drawing/2014/main" id="{BB873619-EE9F-43B8-A7EB-C1A909EAEA31}"/>
+              </a:ext>
+            </a:extLst>
+          </p:cNvPr>
+          <p:cNvPicPr>
+            <a:picLocks noChangeAspect="1"/>
+          </p:cNvPicPr>
+          <p:nvPr/>
+        </p:nvPicPr>
+        <p:blipFill>
+          <a:blip r:embed="rId2"/>
+          <a:stretch>
+            <a:fillRect/>
+          </a:stretch>
+        </p:blipFill>
+        <p:spPr>
+          <a:xfrm>
+            <a:off x="0" y="0"/>
+            <a:ext cx="12192000" cy="6176963"/>
+          </a:xfrm>
+          <a:prstGeom prst="rect">
+            <a:avLst/>
+          </a:prstGeom>
+        </p:spPr>
+      </p:pic>
+    </p:spTree>
+    <p:extLst>
+      <p:ext uri="{BB962C8B-B14F-4D97-AF65-F5344CB8AC3E}">
+        <p14:creationId xmlns:p14="http://schemas.microsoft.com/office/powerpoint/2010/main" val="2495647571"/>
+      </p:ext>
+    </p:extLst>
+  </p:cSld>
+  <p:clrMapOvr>
+    <a:masterClrMapping/>
+  </p:clrMapOvr>
+</p:sld>
+</file>
+
+<file path=ppt/slides/slide6.xml><?xml version="1.0" encoding="utf-8"?>
+<p:sld xmlns:a="http://schemas.openxmlformats.org/drawingml/2006/main" xmlns:r="http://schemas.openxmlformats.org/officeDocument/2006/relationships" xmlns:p="http://schemas.openxmlformats.org/presentationml/2006/main">
+  <p:cSld>
+    <p:spTree>
+      <p:nvGrpSpPr>
+        <p:cNvPr id="1" name=""/>
+        <p:cNvGrpSpPr/>
+        <p:nvPr/>
+      </p:nvGrpSpPr>
+      <p:grpSpPr>
+        <a:xfrm>
+          <a:off x="0" y="0"/>
+          <a:ext cx="0" cy="0"/>
+          <a:chOff x="0" y="0"/>
+          <a:chExt cx="0" cy="0"/>
+        </a:xfrm>
+      </p:grpSpPr>
+      <p:pic>
+        <p:nvPicPr>
           <p:cNvPr id="10" name="Imagen 9">
             <a:extLst>
               <a:ext uri="{FF2B5EF4-FFF2-40B4-BE49-F238E27FC236}">
@@ -5374,7 +7330,7 @@
 </p:sld>
 </file>
 
-<file path=ppt/slides/slide4.xml><?xml version="1.0" encoding="utf-8"?>
+<file path=ppt/slides/slide7.xml><?xml version="1.0" encoding="utf-8"?>
 <p:sld xmlns:a="http://schemas.openxmlformats.org/drawingml/2006/main" xmlns:r="http://schemas.openxmlformats.org/officeDocument/2006/relationships" xmlns:p="http://schemas.openxmlformats.org/presentationml/2006/main">
   <p:cSld>
     <p:spTree>
@@ -6325,7 +8281,7 @@
 </p:sld>
 </file>
 
-<file path=ppt/slides/slide5.xml><?xml version="1.0" encoding="utf-8"?>
+<file path=ppt/slides/slide8.xml><?xml version="1.0" encoding="utf-8"?>
 <p:sld xmlns:a="http://schemas.openxmlformats.org/drawingml/2006/main" xmlns:r="http://schemas.openxmlformats.org/officeDocument/2006/relationships" xmlns:p="http://schemas.openxmlformats.org/presentationml/2006/main">
   <p:cSld>
     <p:spTree>
@@ -7240,1440 +9196,6 @@
 </p:sld>
 </file>
 
-<file path=ppt/slides/slide6.xml><?xml version="1.0" encoding="utf-8"?>
-<p:sld xmlns:a="http://schemas.openxmlformats.org/drawingml/2006/main" xmlns:r="http://schemas.openxmlformats.org/officeDocument/2006/relationships" xmlns:p="http://schemas.openxmlformats.org/presentationml/2006/main">
-  <p:cSld>
-    <p:spTree>
-      <p:nvGrpSpPr>
-        <p:cNvPr id="1" name=""/>
-        <p:cNvGrpSpPr/>
-        <p:nvPr/>
-      </p:nvGrpSpPr>
-      <p:grpSpPr>
-        <a:xfrm>
-          <a:off x="0" y="0"/>
-          <a:ext cx="0" cy="0"/>
-          <a:chOff x="0" y="0"/>
-          <a:chExt cx="0" cy="0"/>
-        </a:xfrm>
-      </p:grpSpPr>
-      <p:pic>
-        <p:nvPicPr>
-          <p:cNvPr id="10" name="Imagen 9">
-            <a:extLst>
-              <a:ext uri="{FF2B5EF4-FFF2-40B4-BE49-F238E27FC236}">
-                <a16:creationId xmlns:a16="http://schemas.microsoft.com/office/drawing/2014/main" id="{15B1CB55-DE9C-472F-9798-9D941F19E5AD}"/>
-              </a:ext>
-            </a:extLst>
-          </p:cNvPr>
-          <p:cNvPicPr>
-            <a:picLocks noChangeAspect="1"/>
-          </p:cNvPicPr>
-          <p:nvPr/>
-        </p:nvPicPr>
-        <p:blipFill>
-          <a:blip r:embed="rId2">
-            <a:extLst>
-              <a:ext uri="{28A0092B-C50C-407E-A947-70E740481C1C}">
-                <a14:useLocalDpi xmlns:a14="http://schemas.microsoft.com/office/drawing/2010/main" val="0"/>
-              </a:ext>
-            </a:extLst>
-          </a:blip>
-          <a:stretch>
-            <a:fillRect/>
-          </a:stretch>
-        </p:blipFill>
-        <p:spPr>
-          <a:xfrm>
-            <a:off x="0" y="0"/>
-            <a:ext cx="12192000" cy="6858000"/>
-          </a:xfrm>
-          <a:prstGeom prst="rect">
-            <a:avLst/>
-          </a:prstGeom>
-        </p:spPr>
-      </p:pic>
-      <p:sp>
-        <p:nvSpPr>
-          <p:cNvPr id="31" name="Rectángulo: esquinas redondeadas 30">
-            <a:extLst>
-              <a:ext uri="{FF2B5EF4-FFF2-40B4-BE49-F238E27FC236}">
-                <a16:creationId xmlns:a16="http://schemas.microsoft.com/office/drawing/2014/main" id="{10C4A791-9A21-475D-ACF5-DB771A703045}"/>
-              </a:ext>
-            </a:extLst>
-          </p:cNvPr>
-          <p:cNvSpPr/>
-          <p:nvPr/>
-        </p:nvSpPr>
-        <p:spPr>
-          <a:xfrm>
-            <a:off x="4379843" y="2960214"/>
-            <a:ext cx="3432313" cy="829553"/>
-          </a:xfrm>
-          <a:prstGeom prst="roundRect">
-            <a:avLst/>
-          </a:prstGeom>
-          <a:solidFill>
-            <a:srgbClr val="FF0000"/>
-          </a:solidFill>
-          <a:ln>
-            <a:noFill/>
-          </a:ln>
-        </p:spPr>
-        <p:style>
-          <a:lnRef idx="2">
-            <a:schemeClr val="accent1">
-              <a:shade val="50000"/>
-            </a:schemeClr>
-          </a:lnRef>
-          <a:fillRef idx="1">
-            <a:schemeClr val="accent1"/>
-          </a:fillRef>
-          <a:effectRef idx="0">
-            <a:schemeClr val="accent1"/>
-          </a:effectRef>
-          <a:fontRef idx="minor">
-            <a:schemeClr val="lt1"/>
-          </a:fontRef>
-        </p:style>
-        <p:txBody>
-          <a:bodyPr rtlCol="0" anchor="ctr"/>
-          <a:lstStyle/>
-          <a:p>
-            <a:pPr algn="ctr"/>
-            <a:r>
-              <a:rPr lang="es-MX" dirty="0" err="1"/>
-              <a:t>Businnes</a:t>
-            </a:r>
-            <a:r>
-              <a:rPr lang="es-MX" dirty="0"/>
-              <a:t> </a:t>
-            </a:r>
-            <a:r>
-              <a:rPr lang="es-MX" dirty="0" err="1"/>
-              <a:t>Logic</a:t>
-            </a:r>
-            <a:r>
-              <a:rPr lang="es-MX" dirty="0"/>
-              <a:t> Layer</a:t>
-            </a:r>
-          </a:p>
-        </p:txBody>
-      </p:sp>
-      <p:pic>
-        <p:nvPicPr>
-          <p:cNvPr id="32" name="Imagen 31">
-            <a:extLst>
-              <a:ext uri="{FF2B5EF4-FFF2-40B4-BE49-F238E27FC236}">
-                <a16:creationId xmlns:a16="http://schemas.microsoft.com/office/drawing/2014/main" id="{C065F537-DE50-4AA5-9CF7-5DF32EB91688}"/>
-              </a:ext>
-            </a:extLst>
-          </p:cNvPr>
-          <p:cNvPicPr>
-            <a:picLocks noChangeAspect="1"/>
-          </p:cNvPicPr>
-          <p:nvPr/>
-        </p:nvPicPr>
-        <p:blipFill>
-          <a:blip r:embed="rId3">
-            <a:extLst>
-              <a:ext uri="{28A0092B-C50C-407E-A947-70E740481C1C}">
-                <a14:useLocalDpi xmlns:a14="http://schemas.microsoft.com/office/drawing/2010/main" val="0"/>
-              </a:ext>
-            </a:extLst>
-          </a:blip>
-          <a:stretch>
-            <a:fillRect/>
-          </a:stretch>
-        </p:blipFill>
-        <p:spPr>
-          <a:xfrm>
-            <a:off x="5161991" y="269787"/>
-            <a:ext cx="1793530" cy="1793530"/>
-          </a:xfrm>
-          <a:prstGeom prst="rect">
-            <a:avLst/>
-          </a:prstGeom>
-        </p:spPr>
-      </p:pic>
-      <p:sp>
-        <p:nvSpPr>
-          <p:cNvPr id="33" name="Rectángulo: esquinas redondeadas 32">
-            <a:extLst>
-              <a:ext uri="{FF2B5EF4-FFF2-40B4-BE49-F238E27FC236}">
-                <a16:creationId xmlns:a16="http://schemas.microsoft.com/office/drawing/2014/main" id="{64BBD172-F04F-40C3-A146-D230CCD3DF98}"/>
-              </a:ext>
-            </a:extLst>
-          </p:cNvPr>
-          <p:cNvSpPr/>
-          <p:nvPr/>
-        </p:nvSpPr>
-        <p:spPr>
-          <a:xfrm>
-            <a:off x="4379843" y="4234785"/>
-            <a:ext cx="3432313" cy="829553"/>
-          </a:xfrm>
-          <a:prstGeom prst="roundRect">
-            <a:avLst/>
-          </a:prstGeom>
-          <a:solidFill>
-            <a:schemeClr val="accent6">
-              <a:lumMod val="75000"/>
-            </a:schemeClr>
-          </a:solidFill>
-          <a:ln>
-            <a:noFill/>
-          </a:ln>
-        </p:spPr>
-        <p:style>
-          <a:lnRef idx="2">
-            <a:schemeClr val="accent1">
-              <a:shade val="50000"/>
-            </a:schemeClr>
-          </a:lnRef>
-          <a:fillRef idx="1">
-            <a:schemeClr val="accent1"/>
-          </a:fillRef>
-          <a:effectRef idx="0">
-            <a:schemeClr val="accent1"/>
-          </a:effectRef>
-          <a:fontRef idx="minor">
-            <a:schemeClr val="lt1"/>
-          </a:fontRef>
-        </p:style>
-        <p:txBody>
-          <a:bodyPr rtlCol="0" anchor="ctr"/>
-          <a:lstStyle/>
-          <a:p>
-            <a:pPr algn="ctr"/>
-            <a:r>
-              <a:rPr lang="es-MX" dirty="0"/>
-              <a:t>Data Access Layer</a:t>
-            </a:r>
-          </a:p>
-        </p:txBody>
-      </p:sp>
-      <p:pic>
-        <p:nvPicPr>
-          <p:cNvPr id="34" name="Imagen 33">
-            <a:extLst>
-              <a:ext uri="{FF2B5EF4-FFF2-40B4-BE49-F238E27FC236}">
-                <a16:creationId xmlns:a16="http://schemas.microsoft.com/office/drawing/2014/main" id="{ADDB3985-091D-4C31-A369-99C1FE3472A4}"/>
-              </a:ext>
-            </a:extLst>
-          </p:cNvPr>
-          <p:cNvPicPr>
-            <a:picLocks noChangeAspect="1"/>
-          </p:cNvPicPr>
-          <p:nvPr/>
-        </p:nvPicPr>
-        <p:blipFill>
-          <a:blip r:embed="rId4">
-            <a:extLst>
-              <a:ext uri="{28A0092B-C50C-407E-A947-70E740481C1C}">
-                <a14:useLocalDpi xmlns:a14="http://schemas.microsoft.com/office/drawing/2010/main" val="0"/>
-              </a:ext>
-            </a:extLst>
-          </a:blip>
-          <a:stretch>
-            <a:fillRect/>
-          </a:stretch>
-        </p:blipFill>
-        <p:spPr>
-          <a:xfrm>
-            <a:off x="5644186" y="5820016"/>
-            <a:ext cx="903626" cy="903626"/>
-          </a:xfrm>
-          <a:prstGeom prst="rect">
-            <a:avLst/>
-          </a:prstGeom>
-        </p:spPr>
-      </p:pic>
-      <p:pic>
-        <p:nvPicPr>
-          <p:cNvPr id="36" name="Imagen 35">
-            <a:extLst>
-              <a:ext uri="{FF2B5EF4-FFF2-40B4-BE49-F238E27FC236}">
-                <a16:creationId xmlns:a16="http://schemas.microsoft.com/office/drawing/2014/main" id="{A8087DD6-6313-4EA2-8212-907E5F4AC7A2}"/>
-              </a:ext>
-            </a:extLst>
-          </p:cNvPr>
-          <p:cNvPicPr>
-            <a:picLocks noChangeAspect="1"/>
-          </p:cNvPicPr>
-          <p:nvPr/>
-        </p:nvPicPr>
-        <p:blipFill>
-          <a:blip r:embed="rId5">
-            <a:extLst>
-              <a:ext uri="{28A0092B-C50C-407E-A947-70E740481C1C}">
-                <a14:useLocalDpi xmlns:a14="http://schemas.microsoft.com/office/drawing/2010/main" val="0"/>
-              </a:ext>
-            </a:extLst>
-          </a:blip>
-          <a:stretch>
-            <a:fillRect/>
-          </a:stretch>
-        </p:blipFill>
-        <p:spPr>
-          <a:xfrm>
-            <a:off x="8698325" y="371061"/>
-            <a:ext cx="1372182" cy="1372182"/>
-          </a:xfrm>
-          <a:prstGeom prst="rect">
-            <a:avLst/>
-          </a:prstGeom>
-        </p:spPr>
-      </p:pic>
-      <p:cxnSp>
-        <p:nvCxnSpPr>
-          <p:cNvPr id="40" name="Conector recto de flecha 39">
-            <a:extLst>
-              <a:ext uri="{FF2B5EF4-FFF2-40B4-BE49-F238E27FC236}">
-                <a16:creationId xmlns:a16="http://schemas.microsoft.com/office/drawing/2014/main" id="{EE8BBB9F-6E50-44A0-B085-4B662555A384}"/>
-              </a:ext>
-            </a:extLst>
-          </p:cNvPr>
-          <p:cNvCxnSpPr>
-            <a:cxnSpLocks/>
-            <a:endCxn id="31" idx="0"/>
-          </p:cNvCxnSpPr>
-          <p:nvPr/>
-        </p:nvCxnSpPr>
-        <p:spPr>
-          <a:xfrm>
-            <a:off x="6096000" y="2063317"/>
-            <a:ext cx="0" cy="896897"/>
-          </a:xfrm>
-          <a:prstGeom prst="straightConnector1">
-            <a:avLst/>
-          </a:prstGeom>
-          <a:ln w="76200">
-            <a:solidFill>
-              <a:schemeClr val="tx1"/>
-            </a:solidFill>
-            <a:tailEnd type="triangle"/>
-          </a:ln>
-        </p:spPr>
-        <p:style>
-          <a:lnRef idx="1">
-            <a:schemeClr val="accent1"/>
-          </a:lnRef>
-          <a:fillRef idx="0">
-            <a:schemeClr val="accent1"/>
-          </a:fillRef>
-          <a:effectRef idx="0">
-            <a:schemeClr val="accent1"/>
-          </a:effectRef>
-          <a:fontRef idx="minor">
-            <a:schemeClr val="tx1"/>
-          </a:fontRef>
-        </p:style>
-      </p:cxnSp>
-      <p:cxnSp>
-        <p:nvCxnSpPr>
-          <p:cNvPr id="42" name="Conector recto de flecha 41">
-            <a:extLst>
-              <a:ext uri="{FF2B5EF4-FFF2-40B4-BE49-F238E27FC236}">
-                <a16:creationId xmlns:a16="http://schemas.microsoft.com/office/drawing/2014/main" id="{D7E4C31A-8455-4845-B2D3-FE6C295A6C3F}"/>
-              </a:ext>
-            </a:extLst>
-          </p:cNvPr>
-          <p:cNvCxnSpPr>
-            <a:cxnSpLocks/>
-            <a:stCxn id="31" idx="2"/>
-            <a:endCxn id="33" idx="0"/>
-          </p:cNvCxnSpPr>
-          <p:nvPr/>
-        </p:nvCxnSpPr>
-        <p:spPr>
-          <a:xfrm>
-            <a:off x="6096000" y="3789767"/>
-            <a:ext cx="0" cy="445018"/>
-          </a:xfrm>
-          <a:prstGeom prst="straightConnector1">
-            <a:avLst/>
-          </a:prstGeom>
-          <a:ln w="76200">
-            <a:solidFill>
-              <a:schemeClr val="tx1"/>
-            </a:solidFill>
-            <a:tailEnd type="triangle"/>
-          </a:ln>
-        </p:spPr>
-        <p:style>
-          <a:lnRef idx="1">
-            <a:schemeClr val="accent1"/>
-          </a:lnRef>
-          <a:fillRef idx="0">
-            <a:schemeClr val="accent1"/>
-          </a:fillRef>
-          <a:effectRef idx="0">
-            <a:schemeClr val="accent1"/>
-          </a:effectRef>
-          <a:fontRef idx="minor">
-            <a:schemeClr val="tx1"/>
-          </a:fontRef>
-        </p:style>
-      </p:cxnSp>
-      <p:cxnSp>
-        <p:nvCxnSpPr>
-          <p:cNvPr id="46" name="Conector recto de flecha 45">
-            <a:extLst>
-              <a:ext uri="{FF2B5EF4-FFF2-40B4-BE49-F238E27FC236}">
-                <a16:creationId xmlns:a16="http://schemas.microsoft.com/office/drawing/2014/main" id="{F1C39A21-FC36-4B24-A138-B73CE7E2D4A3}"/>
-              </a:ext>
-            </a:extLst>
-          </p:cNvPr>
-          <p:cNvCxnSpPr>
-            <a:cxnSpLocks/>
-          </p:cNvCxnSpPr>
-          <p:nvPr/>
-        </p:nvCxnSpPr>
-        <p:spPr>
-          <a:xfrm>
-            <a:off x="5844208" y="5064338"/>
-            <a:ext cx="0" cy="755678"/>
-          </a:xfrm>
-          <a:prstGeom prst="straightConnector1">
-            <a:avLst/>
-          </a:prstGeom>
-          <a:ln w="76200">
-            <a:solidFill>
-              <a:schemeClr val="tx1"/>
-            </a:solidFill>
-            <a:tailEnd type="triangle"/>
-          </a:ln>
-        </p:spPr>
-        <p:style>
-          <a:lnRef idx="1">
-            <a:schemeClr val="accent1"/>
-          </a:lnRef>
-          <a:fillRef idx="0">
-            <a:schemeClr val="accent1"/>
-          </a:fillRef>
-          <a:effectRef idx="0">
-            <a:schemeClr val="accent1"/>
-          </a:effectRef>
-          <a:fontRef idx="minor">
-            <a:schemeClr val="tx1"/>
-          </a:fontRef>
-        </p:style>
-      </p:cxnSp>
-      <p:sp>
-        <p:nvSpPr>
-          <p:cNvPr id="48" name="CuadroTexto 47">
-            <a:extLst>
-              <a:ext uri="{FF2B5EF4-FFF2-40B4-BE49-F238E27FC236}">
-                <a16:creationId xmlns:a16="http://schemas.microsoft.com/office/drawing/2014/main" id="{F3318C54-EA7C-419B-BBEB-09E7D8B8086C}"/>
-              </a:ext>
-            </a:extLst>
-          </p:cNvPr>
-          <p:cNvSpPr txBox="1"/>
-          <p:nvPr/>
-        </p:nvSpPr>
-        <p:spPr>
-          <a:xfrm>
-            <a:off x="4054798" y="1802151"/>
-            <a:ext cx="2214386" cy="369332"/>
-          </a:xfrm>
-          <a:prstGeom prst="rect">
-            <a:avLst/>
-          </a:prstGeom>
-          <a:noFill/>
-        </p:spPr>
-        <p:txBody>
-          <a:bodyPr wrap="square" rtlCol="0">
-            <a:spAutoFit/>
-          </a:bodyPr>
-          <a:lstStyle/>
-          <a:p>
-            <a:r>
-              <a:rPr lang="es-MX" dirty="0"/>
-              <a:t>Presentation Layer</a:t>
-            </a:r>
-          </a:p>
-        </p:txBody>
-      </p:sp>
-      <p:cxnSp>
-        <p:nvCxnSpPr>
-          <p:cNvPr id="49" name="Conector recto de flecha 48">
-            <a:extLst>
-              <a:ext uri="{FF2B5EF4-FFF2-40B4-BE49-F238E27FC236}">
-                <a16:creationId xmlns:a16="http://schemas.microsoft.com/office/drawing/2014/main" id="{C90420CF-C796-470C-A9F0-9F6D3F95A38E}"/>
-              </a:ext>
-            </a:extLst>
-          </p:cNvPr>
-          <p:cNvCxnSpPr>
-            <a:cxnSpLocks/>
-          </p:cNvCxnSpPr>
-          <p:nvPr/>
-        </p:nvCxnSpPr>
-        <p:spPr>
-          <a:xfrm>
-            <a:off x="7308574" y="821217"/>
-            <a:ext cx="1389751" cy="0"/>
-          </a:xfrm>
-          <a:prstGeom prst="straightConnector1">
-            <a:avLst/>
-          </a:prstGeom>
-          <a:ln w="76200">
-            <a:solidFill>
-              <a:schemeClr val="tx1"/>
-            </a:solidFill>
-            <a:tailEnd type="triangle"/>
-          </a:ln>
-        </p:spPr>
-        <p:style>
-          <a:lnRef idx="1">
-            <a:schemeClr val="accent1"/>
-          </a:lnRef>
-          <a:fillRef idx="0">
-            <a:schemeClr val="accent1"/>
-          </a:fillRef>
-          <a:effectRef idx="0">
-            <a:schemeClr val="accent1"/>
-          </a:effectRef>
-          <a:fontRef idx="minor">
-            <a:schemeClr val="tx1"/>
-          </a:fontRef>
-        </p:style>
-      </p:cxnSp>
-      <p:cxnSp>
-        <p:nvCxnSpPr>
-          <p:cNvPr id="51" name="Conector recto de flecha 50">
-            <a:extLst>
-              <a:ext uri="{FF2B5EF4-FFF2-40B4-BE49-F238E27FC236}">
-                <a16:creationId xmlns:a16="http://schemas.microsoft.com/office/drawing/2014/main" id="{284D3E57-EA6C-4249-8817-1BA148145DA4}"/>
-              </a:ext>
-            </a:extLst>
-          </p:cNvPr>
-          <p:cNvCxnSpPr>
-            <a:cxnSpLocks/>
-          </p:cNvCxnSpPr>
-          <p:nvPr/>
-        </p:nvCxnSpPr>
-        <p:spPr>
-          <a:xfrm flipH="1">
-            <a:off x="7308575" y="1166552"/>
-            <a:ext cx="1389750" cy="19461"/>
-          </a:xfrm>
-          <a:prstGeom prst="straightConnector1">
-            <a:avLst/>
-          </a:prstGeom>
-          <a:ln w="76200">
-            <a:solidFill>
-              <a:schemeClr val="tx1"/>
-            </a:solidFill>
-            <a:tailEnd type="triangle"/>
-          </a:ln>
-        </p:spPr>
-        <p:style>
-          <a:lnRef idx="1">
-            <a:schemeClr val="accent1"/>
-          </a:lnRef>
-          <a:fillRef idx="0">
-            <a:schemeClr val="accent1"/>
-          </a:fillRef>
-          <a:effectRef idx="0">
-            <a:schemeClr val="accent1"/>
-          </a:effectRef>
-          <a:fontRef idx="minor">
-            <a:schemeClr val="tx1"/>
-          </a:fontRef>
-        </p:style>
-      </p:cxnSp>
-      <p:cxnSp>
-        <p:nvCxnSpPr>
-          <p:cNvPr id="56" name="Conector recto de flecha 55">
-            <a:extLst>
-              <a:ext uri="{FF2B5EF4-FFF2-40B4-BE49-F238E27FC236}">
-                <a16:creationId xmlns:a16="http://schemas.microsoft.com/office/drawing/2014/main" id="{19063F80-6640-4AA9-8C9C-2ED8AFE485C5}"/>
-              </a:ext>
-            </a:extLst>
-          </p:cNvPr>
-          <p:cNvCxnSpPr>
-            <a:cxnSpLocks/>
-          </p:cNvCxnSpPr>
-          <p:nvPr/>
-        </p:nvCxnSpPr>
-        <p:spPr>
-          <a:xfrm flipV="1">
-            <a:off x="6301121" y="4999386"/>
-            <a:ext cx="0" cy="820630"/>
-          </a:xfrm>
-          <a:prstGeom prst="straightConnector1">
-            <a:avLst/>
-          </a:prstGeom>
-          <a:ln w="76200">
-            <a:solidFill>
-              <a:schemeClr val="tx1"/>
-            </a:solidFill>
-            <a:tailEnd type="triangle"/>
-          </a:ln>
-        </p:spPr>
-        <p:style>
-          <a:lnRef idx="1">
-            <a:schemeClr val="accent1"/>
-          </a:lnRef>
-          <a:fillRef idx="0">
-            <a:schemeClr val="accent1"/>
-          </a:fillRef>
-          <a:effectRef idx="0">
-            <a:schemeClr val="accent1"/>
-          </a:effectRef>
-          <a:fontRef idx="minor">
-            <a:schemeClr val="tx1"/>
-          </a:fontRef>
-        </p:style>
-      </p:cxnSp>
-    </p:spTree>
-    <p:extLst>
-      <p:ext uri="{BB962C8B-B14F-4D97-AF65-F5344CB8AC3E}">
-        <p14:creationId xmlns:p14="http://schemas.microsoft.com/office/powerpoint/2010/main" val="4101235804"/>
-      </p:ext>
-    </p:extLst>
-  </p:cSld>
-  <p:clrMapOvr>
-    <a:masterClrMapping/>
-  </p:clrMapOvr>
-</p:sld>
-</file>
-
-<file path=ppt/slides/slide7.xml><?xml version="1.0" encoding="utf-8"?>
-<p:sld xmlns:a="http://schemas.openxmlformats.org/drawingml/2006/main" xmlns:r="http://schemas.openxmlformats.org/officeDocument/2006/relationships" xmlns:p="http://schemas.openxmlformats.org/presentationml/2006/main">
-  <p:cSld>
-    <p:spTree>
-      <p:nvGrpSpPr>
-        <p:cNvPr id="1" name=""/>
-        <p:cNvGrpSpPr/>
-        <p:nvPr/>
-      </p:nvGrpSpPr>
-      <p:grpSpPr>
-        <a:xfrm>
-          <a:off x="0" y="0"/>
-          <a:ext cx="0" cy="0"/>
-          <a:chOff x="0" y="0"/>
-          <a:chExt cx="0" cy="0"/>
-        </a:xfrm>
-      </p:grpSpPr>
-      <p:pic>
-        <p:nvPicPr>
-          <p:cNvPr id="10" name="Imagen 9">
-            <a:extLst>
-              <a:ext uri="{FF2B5EF4-FFF2-40B4-BE49-F238E27FC236}">
-                <a16:creationId xmlns:a16="http://schemas.microsoft.com/office/drawing/2014/main" id="{15B1CB55-DE9C-472F-9798-9D941F19E5AD}"/>
-              </a:ext>
-            </a:extLst>
-          </p:cNvPr>
-          <p:cNvPicPr>
-            <a:picLocks noChangeAspect="1"/>
-          </p:cNvPicPr>
-          <p:nvPr/>
-        </p:nvPicPr>
-        <p:blipFill>
-          <a:blip r:embed="rId2">
-            <a:extLst>
-              <a:ext uri="{28A0092B-C50C-407E-A947-70E740481C1C}">
-                <a14:useLocalDpi xmlns:a14="http://schemas.microsoft.com/office/drawing/2010/main" val="0"/>
-              </a:ext>
-            </a:extLst>
-          </a:blip>
-          <a:stretch>
-            <a:fillRect/>
-          </a:stretch>
-        </p:blipFill>
-        <p:spPr>
-          <a:xfrm>
-            <a:off x="0" y="0"/>
-            <a:ext cx="12192000" cy="6858000"/>
-          </a:xfrm>
-          <a:prstGeom prst="rect">
-            <a:avLst/>
-          </a:prstGeom>
-        </p:spPr>
-      </p:pic>
-      <p:sp>
-        <p:nvSpPr>
-          <p:cNvPr id="2" name="Título 1">
-            <a:extLst>
-              <a:ext uri="{FF2B5EF4-FFF2-40B4-BE49-F238E27FC236}">
-                <a16:creationId xmlns:a16="http://schemas.microsoft.com/office/drawing/2014/main" id="{A29E6CD6-FAAF-4EB2-937D-93C4B0F9CE35}"/>
-              </a:ext>
-            </a:extLst>
-          </p:cNvPr>
-          <p:cNvSpPr>
-            <a:spLocks noGrp="1"/>
-          </p:cNvSpPr>
-          <p:nvPr>
-            <p:ph type="ctrTitle"/>
-          </p:nvPr>
-        </p:nvSpPr>
-        <p:spPr>
-          <a:xfrm>
-            <a:off x="2076408" y="2794992"/>
-            <a:ext cx="7822096" cy="1151076"/>
-          </a:xfrm>
-        </p:spPr>
-        <p:txBody>
-          <a:bodyPr>
-            <a:normAutofit/>
-          </a:bodyPr>
-          <a:lstStyle/>
-          <a:p>
-            <a:r>
-              <a:rPr lang="es-ES" b="1" dirty="0" err="1">
-                <a:latin typeface="Britannic Bold" panose="020B0903060703020204" pitchFamily="34" charset="0"/>
-              </a:rPr>
-              <a:t>Types</a:t>
-            </a:r>
-            <a:r>
-              <a:rPr lang="es-ES" b="1" dirty="0">
-                <a:latin typeface="Britannic Bold" panose="020B0903060703020204" pitchFamily="34" charset="0"/>
-              </a:rPr>
-              <a:t> </a:t>
-            </a:r>
-            <a:r>
-              <a:rPr lang="es-ES" b="1" dirty="0" err="1">
-                <a:latin typeface="Britannic Bold" panose="020B0903060703020204" pitchFamily="34" charset="0"/>
-              </a:rPr>
-              <a:t>of</a:t>
-            </a:r>
-            <a:r>
-              <a:rPr lang="es-ES" b="1" dirty="0">
-                <a:latin typeface="Britannic Bold" panose="020B0903060703020204" pitchFamily="34" charset="0"/>
-              </a:rPr>
-              <a:t> </a:t>
-            </a:r>
-            <a:r>
-              <a:rPr lang="es-ES" b="1" dirty="0" err="1">
-                <a:latin typeface="Britannic Bold" panose="020B0903060703020204" pitchFamily="34" charset="0"/>
-              </a:rPr>
-              <a:t>Exceptions</a:t>
-            </a:r>
-            <a:endParaRPr lang="es-MX" dirty="0">
-              <a:latin typeface="Britannic Bold" panose="020B0903060703020204" pitchFamily="34" charset="0"/>
-            </a:endParaRPr>
-          </a:p>
-        </p:txBody>
-      </p:sp>
-      <p:pic>
-        <p:nvPicPr>
-          <p:cNvPr id="5" name="Imagen 4">
-            <a:extLst>
-              <a:ext uri="{FF2B5EF4-FFF2-40B4-BE49-F238E27FC236}">
-                <a16:creationId xmlns:a16="http://schemas.microsoft.com/office/drawing/2014/main" id="{6B6F33BB-27E9-41F1-86E8-6C44F2753644}"/>
-              </a:ext>
-            </a:extLst>
-          </p:cNvPr>
-          <p:cNvPicPr>
-            <a:picLocks noChangeAspect="1"/>
-          </p:cNvPicPr>
-          <p:nvPr/>
-        </p:nvPicPr>
-        <p:blipFill rotWithShape="1">
-          <a:blip r:embed="rId3">
-            <a:extLst>
-              <a:ext uri="{BEBA8EAE-BF5A-486C-A8C5-ECC9F3942E4B}">
-                <a14:imgProps xmlns:a14="http://schemas.microsoft.com/office/drawing/2010/main">
-                  <a14:imgLayer r:embed="rId4">
-                    <a14:imgEffect>
-                      <a14:backgroundRemoval t="36750" b="67750" l="7750" r="94250">
-                        <a14:foregroundMark x1="21250" y1="53250" x2="21250" y2="53250"/>
-                        <a14:foregroundMark x1="29250" y1="50250" x2="29250" y2="50250"/>
-                        <a14:foregroundMark x1="29750" y1="43250" x2="29750" y2="43250"/>
-                        <a14:foregroundMark x1="49750" y1="52750" x2="49750" y2="52750"/>
-                        <a14:foregroundMark x1="63250" y1="50250" x2="63250" y2="50250"/>
-                        <a14:foregroundMark x1="75750" y1="48750" x2="75750" y2="48750"/>
-                        <a14:foregroundMark x1="85750" y1="48750" x2="85750" y2="48750"/>
-                      </a14:backgroundRemoval>
-                    </a14:imgEffect>
-                  </a14:imgLayer>
-                </a14:imgProps>
-              </a:ext>
-              <a:ext uri="{28A0092B-C50C-407E-A947-70E740481C1C}">
-                <a14:useLocalDpi xmlns:a14="http://schemas.microsoft.com/office/drawing/2010/main" val="0"/>
-              </a:ext>
-            </a:extLst>
-          </a:blip>
-          <a:srcRect l="7896" t="37372" r="6390" b="32811"/>
-          <a:stretch/>
-        </p:blipFill>
-        <p:spPr>
-          <a:xfrm>
-            <a:off x="2184952" y="245838"/>
-            <a:ext cx="2266122" cy="788298"/>
-          </a:xfrm>
-          <a:prstGeom prst="rect">
-            <a:avLst/>
-          </a:prstGeom>
-        </p:spPr>
-      </p:pic>
-      <p:pic>
-        <p:nvPicPr>
-          <p:cNvPr id="7" name="Imagen 6">
-            <a:extLst>
-              <a:ext uri="{FF2B5EF4-FFF2-40B4-BE49-F238E27FC236}">
-                <a16:creationId xmlns:a16="http://schemas.microsoft.com/office/drawing/2014/main" id="{E79F3D0A-E807-4A20-BB57-7BB046212A37}"/>
-              </a:ext>
-            </a:extLst>
-          </p:cNvPr>
-          <p:cNvPicPr>
-            <a:picLocks noChangeAspect="1"/>
-          </p:cNvPicPr>
-          <p:nvPr/>
-        </p:nvPicPr>
-        <p:blipFill>
-          <a:blip r:embed="rId5">
-            <a:extLst>
-              <a:ext uri="{28A0092B-C50C-407E-A947-70E740481C1C}">
-                <a14:useLocalDpi xmlns:a14="http://schemas.microsoft.com/office/drawing/2010/main" val="0"/>
-              </a:ext>
-            </a:extLst>
-          </a:blip>
-          <a:stretch>
-            <a:fillRect/>
-          </a:stretch>
-        </p:blipFill>
-        <p:spPr>
-          <a:xfrm>
-            <a:off x="8965157" y="9546"/>
-            <a:ext cx="933347" cy="1260881"/>
-          </a:xfrm>
-          <a:prstGeom prst="rect">
-            <a:avLst/>
-          </a:prstGeom>
-        </p:spPr>
-      </p:pic>
-    </p:spTree>
-    <p:extLst>
-      <p:ext uri="{BB962C8B-B14F-4D97-AF65-F5344CB8AC3E}">
-        <p14:creationId xmlns:p14="http://schemas.microsoft.com/office/powerpoint/2010/main" val="2789416840"/>
-      </p:ext>
-    </p:extLst>
-  </p:cSld>
-  <p:clrMapOvr>
-    <a:masterClrMapping/>
-  </p:clrMapOvr>
-</p:sld>
-</file>
-
-<file path=ppt/slides/slide8.xml><?xml version="1.0" encoding="utf-8"?>
-<p:sld xmlns:a="http://schemas.openxmlformats.org/drawingml/2006/main" xmlns:r="http://schemas.openxmlformats.org/officeDocument/2006/relationships" xmlns:p="http://schemas.openxmlformats.org/presentationml/2006/main">
-  <p:cSld>
-    <p:spTree>
-      <p:nvGrpSpPr>
-        <p:cNvPr id="1" name=""/>
-        <p:cNvGrpSpPr/>
-        <p:nvPr/>
-      </p:nvGrpSpPr>
-      <p:grpSpPr>
-        <a:xfrm>
-          <a:off x="0" y="0"/>
-          <a:ext cx="0" cy="0"/>
-          <a:chOff x="0" y="0"/>
-          <a:chExt cx="0" cy="0"/>
-        </a:xfrm>
-      </p:grpSpPr>
-      <p:pic>
-        <p:nvPicPr>
-          <p:cNvPr id="10" name="Imagen 9">
-            <a:extLst>
-              <a:ext uri="{FF2B5EF4-FFF2-40B4-BE49-F238E27FC236}">
-                <a16:creationId xmlns:a16="http://schemas.microsoft.com/office/drawing/2014/main" id="{15B1CB55-DE9C-472F-9798-9D941F19E5AD}"/>
-              </a:ext>
-            </a:extLst>
-          </p:cNvPr>
-          <p:cNvPicPr>
-            <a:picLocks noChangeAspect="1"/>
-          </p:cNvPicPr>
-          <p:nvPr/>
-        </p:nvPicPr>
-        <p:blipFill>
-          <a:blip r:embed="rId2">
-            <a:extLst>
-              <a:ext uri="{28A0092B-C50C-407E-A947-70E740481C1C}">
-                <a14:useLocalDpi xmlns:a14="http://schemas.microsoft.com/office/drawing/2010/main" val="0"/>
-              </a:ext>
-            </a:extLst>
-          </a:blip>
-          <a:stretch>
-            <a:fillRect/>
-          </a:stretch>
-        </p:blipFill>
-        <p:spPr>
-          <a:xfrm>
-            <a:off x="0" y="0"/>
-            <a:ext cx="12192000" cy="6858000"/>
-          </a:xfrm>
-          <a:prstGeom prst="rect">
-            <a:avLst/>
-          </a:prstGeom>
-        </p:spPr>
-      </p:pic>
-      <p:sp>
-        <p:nvSpPr>
-          <p:cNvPr id="6" name="Rectángulo: esquinas redondeadas 5">
-            <a:extLst>
-              <a:ext uri="{FF2B5EF4-FFF2-40B4-BE49-F238E27FC236}">
-                <a16:creationId xmlns:a16="http://schemas.microsoft.com/office/drawing/2014/main" id="{6B884CC6-CD28-46B5-A81E-F108CB1124A0}"/>
-              </a:ext>
-            </a:extLst>
-          </p:cNvPr>
-          <p:cNvSpPr/>
-          <p:nvPr/>
-        </p:nvSpPr>
-        <p:spPr>
-          <a:xfrm>
-            <a:off x="5221355" y="795130"/>
-            <a:ext cx="2676939" cy="834887"/>
-          </a:xfrm>
-          <a:prstGeom prst="roundRect">
-            <a:avLst/>
-          </a:prstGeom>
-          <a:solidFill>
-            <a:srgbClr val="FF0000"/>
-          </a:solidFill>
-          <a:ln>
-            <a:noFill/>
-          </a:ln>
-        </p:spPr>
-        <p:style>
-          <a:lnRef idx="2">
-            <a:schemeClr val="accent1">
-              <a:shade val="50000"/>
-            </a:schemeClr>
-          </a:lnRef>
-          <a:fillRef idx="1">
-            <a:schemeClr val="accent1"/>
-          </a:fillRef>
-          <a:effectRef idx="0">
-            <a:schemeClr val="accent1"/>
-          </a:effectRef>
-          <a:fontRef idx="minor">
-            <a:schemeClr val="lt1"/>
-          </a:fontRef>
-        </p:style>
-        <p:txBody>
-          <a:bodyPr rtlCol="0" anchor="ctr"/>
-          <a:lstStyle/>
-          <a:p>
-            <a:pPr algn="ctr"/>
-            <a:r>
-              <a:rPr lang="es-MX" dirty="0" err="1"/>
-              <a:t>Throwable</a:t>
-            </a:r>
-            <a:endParaRPr lang="es-MX" dirty="0"/>
-          </a:p>
-        </p:txBody>
-      </p:sp>
-      <p:sp>
-        <p:nvSpPr>
-          <p:cNvPr id="9" name="Rectángulo: esquinas redondeadas 8">
-            <a:extLst>
-              <a:ext uri="{FF2B5EF4-FFF2-40B4-BE49-F238E27FC236}">
-                <a16:creationId xmlns:a16="http://schemas.microsoft.com/office/drawing/2014/main" id="{4187EB94-CAAA-47B4-99A8-93334B771AD7}"/>
-              </a:ext>
-            </a:extLst>
-          </p:cNvPr>
-          <p:cNvSpPr/>
-          <p:nvPr/>
-        </p:nvSpPr>
-        <p:spPr>
-          <a:xfrm>
-            <a:off x="3220279" y="2843832"/>
-            <a:ext cx="2676939" cy="834887"/>
-          </a:xfrm>
-          <a:prstGeom prst="roundRect">
-            <a:avLst/>
-          </a:prstGeom>
-          <a:solidFill>
-            <a:srgbClr val="E13927"/>
-          </a:solidFill>
-          <a:ln>
-            <a:noFill/>
-          </a:ln>
-        </p:spPr>
-        <p:style>
-          <a:lnRef idx="2">
-            <a:schemeClr val="accent1">
-              <a:shade val="50000"/>
-            </a:schemeClr>
-          </a:lnRef>
-          <a:fillRef idx="1">
-            <a:schemeClr val="accent1"/>
-          </a:fillRef>
-          <a:effectRef idx="0">
-            <a:schemeClr val="accent1"/>
-          </a:effectRef>
-          <a:fontRef idx="minor">
-            <a:schemeClr val="lt1"/>
-          </a:fontRef>
-        </p:style>
-        <p:txBody>
-          <a:bodyPr rtlCol="0" anchor="ctr"/>
-          <a:lstStyle/>
-          <a:p>
-            <a:pPr algn="ctr"/>
-            <a:r>
-              <a:rPr lang="es-MX" dirty="0" err="1"/>
-              <a:t>Exception</a:t>
-            </a:r>
-            <a:endParaRPr lang="es-MX" dirty="0"/>
-          </a:p>
-        </p:txBody>
-      </p:sp>
-      <p:sp>
-        <p:nvSpPr>
-          <p:cNvPr id="11" name="Rectángulo: esquinas redondeadas 10">
-            <a:extLst>
-              <a:ext uri="{FF2B5EF4-FFF2-40B4-BE49-F238E27FC236}">
-                <a16:creationId xmlns:a16="http://schemas.microsoft.com/office/drawing/2014/main" id="{156BDB3B-5C26-491B-8F85-A6E6B40CAC33}"/>
-              </a:ext>
-            </a:extLst>
-          </p:cNvPr>
-          <p:cNvSpPr/>
-          <p:nvPr/>
-        </p:nvSpPr>
-        <p:spPr>
-          <a:xfrm>
-            <a:off x="7706139" y="2843832"/>
-            <a:ext cx="2676939" cy="834887"/>
-          </a:xfrm>
-          <a:prstGeom prst="roundRect">
-            <a:avLst/>
-          </a:prstGeom>
-          <a:solidFill>
-            <a:srgbClr val="BC4C4C"/>
-          </a:solidFill>
-          <a:ln>
-            <a:noFill/>
-          </a:ln>
-        </p:spPr>
-        <p:style>
-          <a:lnRef idx="2">
-            <a:schemeClr val="accent1">
-              <a:shade val="50000"/>
-            </a:schemeClr>
-          </a:lnRef>
-          <a:fillRef idx="1">
-            <a:schemeClr val="accent1"/>
-          </a:fillRef>
-          <a:effectRef idx="0">
-            <a:schemeClr val="accent1"/>
-          </a:effectRef>
-          <a:fontRef idx="minor">
-            <a:schemeClr val="lt1"/>
-          </a:fontRef>
-        </p:style>
-        <p:txBody>
-          <a:bodyPr rtlCol="0" anchor="ctr"/>
-          <a:lstStyle/>
-          <a:p>
-            <a:pPr algn="ctr"/>
-            <a:r>
-              <a:rPr lang="es-MX" dirty="0"/>
-              <a:t>Error</a:t>
-            </a:r>
-          </a:p>
-        </p:txBody>
-      </p:sp>
-      <p:sp>
-        <p:nvSpPr>
-          <p:cNvPr id="12" name="Rectángulo: esquinas redondeadas 11">
-            <a:extLst>
-              <a:ext uri="{FF2B5EF4-FFF2-40B4-BE49-F238E27FC236}">
-                <a16:creationId xmlns:a16="http://schemas.microsoft.com/office/drawing/2014/main" id="{506DF178-B5C9-484C-BD17-89C13E5301EE}"/>
-              </a:ext>
-            </a:extLst>
-          </p:cNvPr>
-          <p:cNvSpPr/>
-          <p:nvPr/>
-        </p:nvSpPr>
-        <p:spPr>
-          <a:xfrm>
-            <a:off x="1961325" y="4892534"/>
-            <a:ext cx="2676939" cy="834887"/>
-          </a:xfrm>
-          <a:prstGeom prst="roundRect">
-            <a:avLst/>
-          </a:prstGeom>
-          <a:solidFill>
-            <a:srgbClr val="E13927"/>
-          </a:solidFill>
-          <a:ln>
-            <a:noFill/>
-          </a:ln>
-        </p:spPr>
-        <p:style>
-          <a:lnRef idx="2">
-            <a:schemeClr val="accent1">
-              <a:shade val="50000"/>
-            </a:schemeClr>
-          </a:lnRef>
-          <a:fillRef idx="1">
-            <a:schemeClr val="accent1"/>
-          </a:fillRef>
-          <a:effectRef idx="0">
-            <a:schemeClr val="accent1"/>
-          </a:effectRef>
-          <a:fontRef idx="minor">
-            <a:schemeClr val="lt1"/>
-          </a:fontRef>
-        </p:style>
-        <p:txBody>
-          <a:bodyPr rtlCol="0" anchor="ctr"/>
-          <a:lstStyle/>
-          <a:p>
-            <a:pPr algn="ctr"/>
-            <a:r>
-              <a:rPr lang="es-MX" dirty="0" err="1"/>
-              <a:t>RunTimeException</a:t>
-            </a:r>
-            <a:endParaRPr lang="es-MX" dirty="0"/>
-          </a:p>
-        </p:txBody>
-      </p:sp>
-      <p:sp>
-        <p:nvSpPr>
-          <p:cNvPr id="13" name="Rectángulo: esquinas redondeadas 12">
-            <a:extLst>
-              <a:ext uri="{FF2B5EF4-FFF2-40B4-BE49-F238E27FC236}">
-                <a16:creationId xmlns:a16="http://schemas.microsoft.com/office/drawing/2014/main" id="{08E37D9E-2CA0-4BD8-8071-0ED534F63402}"/>
-              </a:ext>
-            </a:extLst>
-          </p:cNvPr>
-          <p:cNvSpPr/>
-          <p:nvPr/>
-        </p:nvSpPr>
-        <p:spPr>
-          <a:xfrm>
-            <a:off x="5221357" y="4892534"/>
-            <a:ext cx="2676939" cy="834887"/>
-          </a:xfrm>
-          <a:prstGeom prst="roundRect">
-            <a:avLst/>
-          </a:prstGeom>
-          <a:solidFill>
-            <a:srgbClr val="E13927"/>
-          </a:solidFill>
-          <a:ln>
-            <a:noFill/>
-          </a:ln>
-        </p:spPr>
-        <p:style>
-          <a:lnRef idx="2">
-            <a:schemeClr val="accent1">
-              <a:shade val="50000"/>
-            </a:schemeClr>
-          </a:lnRef>
-          <a:fillRef idx="1">
-            <a:schemeClr val="accent1"/>
-          </a:fillRef>
-          <a:effectRef idx="0">
-            <a:schemeClr val="accent1"/>
-          </a:effectRef>
-          <a:fontRef idx="minor">
-            <a:schemeClr val="lt1"/>
-          </a:fontRef>
-        </p:style>
-        <p:txBody>
-          <a:bodyPr rtlCol="0" anchor="ctr"/>
-          <a:lstStyle/>
-          <a:p>
-            <a:pPr algn="ctr"/>
-            <a:r>
-              <a:rPr lang="es-MX" dirty="0" err="1"/>
-              <a:t>Other</a:t>
-            </a:r>
-            <a:r>
-              <a:rPr lang="es-MX" dirty="0"/>
-              <a:t> </a:t>
-            </a:r>
-            <a:r>
-              <a:rPr lang="es-MX" dirty="0" err="1"/>
-              <a:t>Exceptions</a:t>
-            </a:r>
-            <a:endParaRPr lang="es-MX" dirty="0"/>
-          </a:p>
-        </p:txBody>
-      </p:sp>
-      <p:cxnSp>
-        <p:nvCxnSpPr>
-          <p:cNvPr id="14" name="Conector: angular 13">
-            <a:extLst>
-              <a:ext uri="{FF2B5EF4-FFF2-40B4-BE49-F238E27FC236}">
-                <a16:creationId xmlns:a16="http://schemas.microsoft.com/office/drawing/2014/main" id="{3C7A4881-440D-4E36-80A7-040CA28AF1D0}"/>
-              </a:ext>
-            </a:extLst>
-          </p:cNvPr>
-          <p:cNvCxnSpPr>
-            <a:stCxn id="6" idx="2"/>
-            <a:endCxn id="9" idx="0"/>
-          </p:cNvCxnSpPr>
-          <p:nvPr/>
-        </p:nvCxnSpPr>
-        <p:spPr>
-          <a:xfrm rot="5400000">
-            <a:off x="4952380" y="1236386"/>
-            <a:ext cx="1213815" cy="2001076"/>
-          </a:xfrm>
-          <a:prstGeom prst="bentConnector3">
-            <a:avLst/>
-          </a:prstGeom>
-          <a:ln w="76200">
-            <a:solidFill>
-              <a:schemeClr val="tx1">
-                <a:lumMod val="95000"/>
-                <a:lumOff val="5000"/>
-              </a:schemeClr>
-            </a:solidFill>
-            <a:tailEnd type="triangle"/>
-          </a:ln>
-        </p:spPr>
-        <p:style>
-          <a:lnRef idx="1">
-            <a:schemeClr val="accent1"/>
-          </a:lnRef>
-          <a:fillRef idx="0">
-            <a:schemeClr val="accent1"/>
-          </a:fillRef>
-          <a:effectRef idx="0">
-            <a:schemeClr val="accent1"/>
-          </a:effectRef>
-          <a:fontRef idx="minor">
-            <a:schemeClr val="tx1"/>
-          </a:fontRef>
-        </p:style>
-      </p:cxnSp>
-      <p:cxnSp>
-        <p:nvCxnSpPr>
-          <p:cNvPr id="16" name="Conector: angular 15">
-            <a:extLst>
-              <a:ext uri="{FF2B5EF4-FFF2-40B4-BE49-F238E27FC236}">
-                <a16:creationId xmlns:a16="http://schemas.microsoft.com/office/drawing/2014/main" id="{B9966494-4D06-4AE7-ABB8-0CE935E94E11}"/>
-              </a:ext>
-            </a:extLst>
-          </p:cNvPr>
-          <p:cNvCxnSpPr>
-            <a:stCxn id="9" idx="2"/>
-            <a:endCxn id="12" idx="0"/>
-          </p:cNvCxnSpPr>
-          <p:nvPr/>
-        </p:nvCxnSpPr>
-        <p:spPr>
-          <a:xfrm rot="5400000">
-            <a:off x="3322365" y="3656149"/>
-            <a:ext cx="1213815" cy="1258954"/>
-          </a:xfrm>
-          <a:prstGeom prst="bentConnector3">
-            <a:avLst/>
-          </a:prstGeom>
-          <a:ln w="76200">
-            <a:solidFill>
-              <a:schemeClr val="tx1">
-                <a:lumMod val="95000"/>
-                <a:lumOff val="5000"/>
-              </a:schemeClr>
-            </a:solidFill>
-            <a:tailEnd type="triangle"/>
-          </a:ln>
-        </p:spPr>
-        <p:style>
-          <a:lnRef idx="1">
-            <a:schemeClr val="accent1"/>
-          </a:lnRef>
-          <a:fillRef idx="0">
-            <a:schemeClr val="accent1"/>
-          </a:fillRef>
-          <a:effectRef idx="0">
-            <a:schemeClr val="accent1"/>
-          </a:effectRef>
-          <a:fontRef idx="minor">
-            <a:schemeClr val="tx1"/>
-          </a:fontRef>
-        </p:style>
-      </p:cxnSp>
-      <p:cxnSp>
-        <p:nvCxnSpPr>
-          <p:cNvPr id="18" name="Conector: angular 17">
-            <a:extLst>
-              <a:ext uri="{FF2B5EF4-FFF2-40B4-BE49-F238E27FC236}">
-                <a16:creationId xmlns:a16="http://schemas.microsoft.com/office/drawing/2014/main" id="{C6CC9C63-6552-440E-A512-A9181CECE137}"/>
-              </a:ext>
-            </a:extLst>
-          </p:cNvPr>
-          <p:cNvCxnSpPr>
-            <a:endCxn id="13" idx="0"/>
-          </p:cNvCxnSpPr>
-          <p:nvPr/>
-        </p:nvCxnSpPr>
-        <p:spPr>
-          <a:xfrm>
-            <a:off x="4558750" y="3813723"/>
-            <a:ext cx="2001077" cy="1078811"/>
-          </a:xfrm>
-          <a:prstGeom prst="bentConnector2">
-            <a:avLst/>
-          </a:prstGeom>
-          <a:ln w="76200">
-            <a:solidFill>
-              <a:schemeClr val="tx1">
-                <a:lumMod val="95000"/>
-                <a:lumOff val="5000"/>
-              </a:schemeClr>
-            </a:solidFill>
-            <a:tailEnd type="triangle"/>
-          </a:ln>
-        </p:spPr>
-        <p:style>
-          <a:lnRef idx="1">
-            <a:schemeClr val="accent1"/>
-          </a:lnRef>
-          <a:fillRef idx="0">
-            <a:schemeClr val="accent1"/>
-          </a:fillRef>
-          <a:effectRef idx="0">
-            <a:schemeClr val="accent1"/>
-          </a:effectRef>
-          <a:fontRef idx="minor">
-            <a:schemeClr val="tx1"/>
-          </a:fontRef>
-        </p:style>
-      </p:cxnSp>
-      <p:cxnSp>
-        <p:nvCxnSpPr>
-          <p:cNvPr id="24" name="Conector: angular 23">
-            <a:extLst>
-              <a:ext uri="{FF2B5EF4-FFF2-40B4-BE49-F238E27FC236}">
-                <a16:creationId xmlns:a16="http://schemas.microsoft.com/office/drawing/2014/main" id="{266AADAA-745D-449E-A250-11863A4F7FDE}"/>
-              </a:ext>
-            </a:extLst>
-          </p:cNvPr>
-          <p:cNvCxnSpPr>
-            <a:stCxn id="6" idx="2"/>
-            <a:endCxn id="11" idx="0"/>
-          </p:cNvCxnSpPr>
-          <p:nvPr/>
-        </p:nvCxnSpPr>
-        <p:spPr>
-          <a:xfrm rot="16200000" flipH="1">
-            <a:off x="7195310" y="994532"/>
-            <a:ext cx="1213815" cy="2484784"/>
-          </a:xfrm>
-          <a:prstGeom prst="bentConnector3">
-            <a:avLst/>
-          </a:prstGeom>
-          <a:ln w="76200">
-            <a:solidFill>
-              <a:schemeClr val="tx1">
-                <a:lumMod val="95000"/>
-                <a:lumOff val="5000"/>
-              </a:schemeClr>
-            </a:solidFill>
-            <a:tailEnd type="triangle"/>
-          </a:ln>
-        </p:spPr>
-        <p:style>
-          <a:lnRef idx="1">
-            <a:schemeClr val="accent1"/>
-          </a:lnRef>
-          <a:fillRef idx="0">
-            <a:schemeClr val="accent1"/>
-          </a:fillRef>
-          <a:effectRef idx="0">
-            <a:schemeClr val="accent1"/>
-          </a:effectRef>
-          <a:fontRef idx="minor">
-            <a:schemeClr val="tx1"/>
-          </a:fontRef>
-        </p:style>
-      </p:cxnSp>
-      <p:sp>
-        <p:nvSpPr>
-          <p:cNvPr id="26" name="CuadroTexto 25">
-            <a:extLst>
-              <a:ext uri="{FF2B5EF4-FFF2-40B4-BE49-F238E27FC236}">
-                <a16:creationId xmlns:a16="http://schemas.microsoft.com/office/drawing/2014/main" id="{598FDB93-A8D9-461D-9FB7-3986F10D1374}"/>
-              </a:ext>
-            </a:extLst>
-          </p:cNvPr>
-          <p:cNvSpPr txBox="1"/>
-          <p:nvPr/>
-        </p:nvSpPr>
-        <p:spPr>
-          <a:xfrm>
-            <a:off x="2305877" y="5786679"/>
-            <a:ext cx="2252871" cy="369332"/>
-          </a:xfrm>
-          <a:prstGeom prst="rect">
-            <a:avLst/>
-          </a:prstGeom>
-          <a:noFill/>
-        </p:spPr>
-        <p:txBody>
-          <a:bodyPr wrap="square" rtlCol="0">
-            <a:spAutoFit/>
-          </a:bodyPr>
-          <a:lstStyle/>
-          <a:p>
-            <a:r>
-              <a:rPr lang="es-MX" dirty="0" err="1"/>
-              <a:t>UnChecked</a:t>
-            </a:r>
-            <a:endParaRPr lang="es-MX" dirty="0"/>
-          </a:p>
-        </p:txBody>
-      </p:sp>
-      <p:sp>
-        <p:nvSpPr>
-          <p:cNvPr id="27" name="CuadroTexto 26">
-            <a:extLst>
-              <a:ext uri="{FF2B5EF4-FFF2-40B4-BE49-F238E27FC236}">
-                <a16:creationId xmlns:a16="http://schemas.microsoft.com/office/drawing/2014/main" id="{C32FCFF8-A0D3-4B34-AD5E-831AB8DE251A}"/>
-              </a:ext>
-            </a:extLst>
-          </p:cNvPr>
-          <p:cNvSpPr txBox="1"/>
-          <p:nvPr/>
-        </p:nvSpPr>
-        <p:spPr>
-          <a:xfrm>
-            <a:off x="5380383" y="5786679"/>
-            <a:ext cx="2252871" cy="369332"/>
-          </a:xfrm>
-          <a:prstGeom prst="rect">
-            <a:avLst/>
-          </a:prstGeom>
-          <a:noFill/>
-        </p:spPr>
-        <p:txBody>
-          <a:bodyPr wrap="square" rtlCol="0">
-            <a:spAutoFit/>
-          </a:bodyPr>
-          <a:lstStyle/>
-          <a:p>
-            <a:r>
-              <a:rPr lang="es-MX" dirty="0" err="1"/>
-              <a:t>Checked</a:t>
-            </a:r>
-            <a:endParaRPr lang="es-MX" dirty="0"/>
-          </a:p>
-        </p:txBody>
-      </p:sp>
-    </p:spTree>
-    <p:extLst>
-      <p:ext uri="{BB962C8B-B14F-4D97-AF65-F5344CB8AC3E}">
-        <p14:creationId xmlns:p14="http://schemas.microsoft.com/office/powerpoint/2010/main" val="1917612476"/>
-      </p:ext>
-    </p:extLst>
-  </p:cSld>
-  <p:clrMapOvr>
-    <a:masterClrMapping/>
-  </p:clrMapOvr>
-</p:sld>
-</file>
-
 <file path=ppt/slides/slide9.xml><?xml version="1.0" encoding="utf-8"?>
 <p:sld xmlns:a="http://schemas.openxmlformats.org/drawingml/2006/main" xmlns:r="http://schemas.openxmlformats.org/officeDocument/2006/relationships" xmlns:p="http://schemas.openxmlformats.org/presentationml/2006/main">
   <p:cSld>
@@ -8729,68 +9251,77 @@
       </p:pic>
       <p:sp>
         <p:nvSpPr>
-          <p:cNvPr id="2" name="Título 1">
-            <a:extLst>
-              <a:ext uri="{FF2B5EF4-FFF2-40B4-BE49-F238E27FC236}">
-                <a16:creationId xmlns:a16="http://schemas.microsoft.com/office/drawing/2014/main" id="{A29E6CD6-FAAF-4EB2-937D-93C4B0F9CE35}"/>
-              </a:ext>
-            </a:extLst>
-          </p:cNvPr>
-          <p:cNvSpPr>
-            <a:spLocks noGrp="1"/>
-          </p:cNvSpPr>
-          <p:nvPr>
-            <p:ph type="ctrTitle"/>
-          </p:nvPr>
-        </p:nvSpPr>
-        <p:spPr>
-          <a:xfrm>
-            <a:off x="2076408" y="2794992"/>
-            <a:ext cx="7822096" cy="1151076"/>
-          </a:xfrm>
-        </p:spPr>
-        <p:txBody>
-          <a:bodyPr>
-            <a:normAutofit/>
-          </a:bodyPr>
-          <a:lstStyle/>
-          <a:p>
-            <a:r>
-              <a:rPr lang="es-ES" b="1" dirty="0" err="1">
-                <a:latin typeface="Britannic Bold" panose="020B0903060703020204" pitchFamily="34" charset="0"/>
-              </a:rPr>
-              <a:t>Purposes</a:t>
-            </a:r>
-            <a:r>
-              <a:rPr lang="es-ES" b="1" dirty="0">
-                <a:latin typeface="Britannic Bold" panose="020B0903060703020204" pitchFamily="34" charset="0"/>
-              </a:rPr>
+          <p:cNvPr id="31" name="Rectángulo: esquinas redondeadas 30">
+            <a:extLst>
+              <a:ext uri="{FF2B5EF4-FFF2-40B4-BE49-F238E27FC236}">
+                <a16:creationId xmlns:a16="http://schemas.microsoft.com/office/drawing/2014/main" id="{10C4A791-9A21-475D-ACF5-DB771A703045}"/>
+              </a:ext>
+            </a:extLst>
+          </p:cNvPr>
+          <p:cNvSpPr/>
+          <p:nvPr/>
+        </p:nvSpPr>
+        <p:spPr>
+          <a:xfrm>
+            <a:off x="4379843" y="2960214"/>
+            <a:ext cx="3432313" cy="829553"/>
+          </a:xfrm>
+          <a:prstGeom prst="roundRect">
+            <a:avLst/>
+          </a:prstGeom>
+          <a:solidFill>
+            <a:srgbClr val="FF0000"/>
+          </a:solidFill>
+          <a:ln>
+            <a:noFill/>
+          </a:ln>
+        </p:spPr>
+        <p:style>
+          <a:lnRef idx="2">
+            <a:schemeClr val="accent1">
+              <a:shade val="50000"/>
+            </a:schemeClr>
+          </a:lnRef>
+          <a:fillRef idx="1">
+            <a:schemeClr val="accent1"/>
+          </a:fillRef>
+          <a:effectRef idx="0">
+            <a:schemeClr val="accent1"/>
+          </a:effectRef>
+          <a:fontRef idx="minor">
+            <a:schemeClr val="lt1"/>
+          </a:fontRef>
+        </p:style>
+        <p:txBody>
+          <a:bodyPr rtlCol="0" anchor="ctr"/>
+          <a:lstStyle/>
+          <a:p>
+            <a:pPr algn="ctr"/>
+            <a:r>
+              <a:rPr lang="es-MX" dirty="0" err="1"/>
+              <a:t>Businnes</a:t>
+            </a:r>
+            <a:r>
+              <a:rPr lang="es-MX" dirty="0"/>
               <a:t> </a:t>
             </a:r>
             <a:r>
-              <a:rPr lang="es-ES" b="1" dirty="0" err="1">
-                <a:latin typeface="Britannic Bold" panose="020B0903060703020204" pitchFamily="34" charset="0"/>
-              </a:rPr>
-              <a:t>of</a:t>
-            </a:r>
-            <a:r>
-              <a:rPr lang="es-ES" b="1" dirty="0">
-                <a:latin typeface="Britannic Bold" panose="020B0903060703020204" pitchFamily="34" charset="0"/>
-              </a:rPr>
-              <a:t> final</a:t>
-            </a:r>
-            <a:endParaRPr lang="es-MX" dirty="0">
-              <a:latin typeface="Britannic Bold" panose="020B0903060703020204" pitchFamily="34" charset="0"/>
-            </a:endParaRPr>
+              <a:rPr lang="es-MX" dirty="0" err="1"/>
+              <a:t>Logic</a:t>
+            </a:r>
+            <a:r>
+              <a:rPr lang="es-MX" dirty="0"/>
+              <a:t> Layer</a:t>
+            </a:r>
           </a:p>
         </p:txBody>
       </p:sp>
       <p:pic>
         <p:nvPicPr>
-          <p:cNvPr id="5" name="Imagen 4">
-            <a:extLst>
-              <a:ext uri="{FF2B5EF4-FFF2-40B4-BE49-F238E27FC236}">
-                <a16:creationId xmlns:a16="http://schemas.microsoft.com/office/drawing/2014/main" id="{6B6F33BB-27E9-41F1-86E8-6C44F2753644}"/>
+          <p:cNvPr id="32" name="Imagen 31">
+            <a:extLst>
+              <a:ext uri="{FF2B5EF4-FFF2-40B4-BE49-F238E27FC236}">
+                <a16:creationId xmlns:a16="http://schemas.microsoft.com/office/drawing/2014/main" id="{C065F537-DE50-4AA5-9CF7-5DF32EB91688}"/>
               </a:ext>
             </a:extLst>
           </p:cNvPr>
@@ -8799,60 +9330,8 @@
           </p:cNvPicPr>
           <p:nvPr/>
         </p:nvPicPr>
-        <p:blipFill rotWithShape="1">
+        <p:blipFill>
           <a:blip r:embed="rId3">
-            <a:extLst>
-              <a:ext uri="{BEBA8EAE-BF5A-486C-A8C5-ECC9F3942E4B}">
-                <a14:imgProps xmlns:a14="http://schemas.microsoft.com/office/drawing/2010/main">
-                  <a14:imgLayer r:embed="rId4">
-                    <a14:imgEffect>
-                      <a14:backgroundRemoval t="36750" b="67750" l="7750" r="94250">
-                        <a14:foregroundMark x1="21250" y1="53250" x2="21250" y2="53250"/>
-                        <a14:foregroundMark x1="29250" y1="50250" x2="29250" y2="50250"/>
-                        <a14:foregroundMark x1="29750" y1="43250" x2="29750" y2="43250"/>
-                        <a14:foregroundMark x1="49750" y1="52750" x2="49750" y2="52750"/>
-                        <a14:foregroundMark x1="63250" y1="50250" x2="63250" y2="50250"/>
-                        <a14:foregroundMark x1="75750" y1="48750" x2="75750" y2="48750"/>
-                        <a14:foregroundMark x1="85750" y1="48750" x2="85750" y2="48750"/>
-                      </a14:backgroundRemoval>
-                    </a14:imgEffect>
-                  </a14:imgLayer>
-                </a14:imgProps>
-              </a:ext>
-              <a:ext uri="{28A0092B-C50C-407E-A947-70E740481C1C}">
-                <a14:useLocalDpi xmlns:a14="http://schemas.microsoft.com/office/drawing/2010/main" val="0"/>
-              </a:ext>
-            </a:extLst>
-          </a:blip>
-          <a:srcRect l="7896" t="37372" r="6390" b="32811"/>
-          <a:stretch/>
-        </p:blipFill>
-        <p:spPr>
-          <a:xfrm>
-            <a:off x="2184952" y="245838"/>
-            <a:ext cx="2266122" cy="788298"/>
-          </a:xfrm>
-          <a:prstGeom prst="rect">
-            <a:avLst/>
-          </a:prstGeom>
-        </p:spPr>
-      </p:pic>
-      <p:pic>
-        <p:nvPicPr>
-          <p:cNvPr id="7" name="Imagen 6">
-            <a:extLst>
-              <a:ext uri="{FF2B5EF4-FFF2-40B4-BE49-F238E27FC236}">
-                <a16:creationId xmlns:a16="http://schemas.microsoft.com/office/drawing/2014/main" id="{E79F3D0A-E807-4A20-BB57-7BB046212A37}"/>
-              </a:ext>
-            </a:extLst>
-          </p:cNvPr>
-          <p:cNvPicPr>
-            <a:picLocks noChangeAspect="1"/>
-          </p:cNvPicPr>
-          <p:nvPr/>
-        </p:nvPicPr>
-        <p:blipFill>
-          <a:blip r:embed="rId5">
             <a:extLst>
               <a:ext uri="{28A0092B-C50C-407E-A947-70E740481C1C}">
                 <a14:useLocalDpi xmlns:a14="http://schemas.microsoft.com/office/drawing/2010/main" val="0"/>
@@ -8865,18 +9344,449 @@
         </p:blipFill>
         <p:spPr>
           <a:xfrm>
-            <a:off x="8965157" y="9546"/>
-            <a:ext cx="933347" cy="1260881"/>
+            <a:off x="5161991" y="269787"/>
+            <a:ext cx="1793530" cy="1793530"/>
           </a:xfrm>
           <a:prstGeom prst="rect">
             <a:avLst/>
           </a:prstGeom>
         </p:spPr>
       </p:pic>
+      <p:sp>
+        <p:nvSpPr>
+          <p:cNvPr id="33" name="Rectángulo: esquinas redondeadas 32">
+            <a:extLst>
+              <a:ext uri="{FF2B5EF4-FFF2-40B4-BE49-F238E27FC236}">
+                <a16:creationId xmlns:a16="http://schemas.microsoft.com/office/drawing/2014/main" id="{64BBD172-F04F-40C3-A146-D230CCD3DF98}"/>
+              </a:ext>
+            </a:extLst>
+          </p:cNvPr>
+          <p:cNvSpPr/>
+          <p:nvPr/>
+        </p:nvSpPr>
+        <p:spPr>
+          <a:xfrm>
+            <a:off x="4379843" y="4234785"/>
+            <a:ext cx="3432313" cy="829553"/>
+          </a:xfrm>
+          <a:prstGeom prst="roundRect">
+            <a:avLst/>
+          </a:prstGeom>
+          <a:solidFill>
+            <a:schemeClr val="accent6">
+              <a:lumMod val="75000"/>
+            </a:schemeClr>
+          </a:solidFill>
+          <a:ln>
+            <a:noFill/>
+          </a:ln>
+        </p:spPr>
+        <p:style>
+          <a:lnRef idx="2">
+            <a:schemeClr val="accent1">
+              <a:shade val="50000"/>
+            </a:schemeClr>
+          </a:lnRef>
+          <a:fillRef idx="1">
+            <a:schemeClr val="accent1"/>
+          </a:fillRef>
+          <a:effectRef idx="0">
+            <a:schemeClr val="accent1"/>
+          </a:effectRef>
+          <a:fontRef idx="minor">
+            <a:schemeClr val="lt1"/>
+          </a:fontRef>
+        </p:style>
+        <p:txBody>
+          <a:bodyPr rtlCol="0" anchor="ctr"/>
+          <a:lstStyle/>
+          <a:p>
+            <a:pPr algn="ctr"/>
+            <a:r>
+              <a:rPr lang="es-MX" dirty="0"/>
+              <a:t>Data Access Layer</a:t>
+            </a:r>
+          </a:p>
+        </p:txBody>
+      </p:sp>
+      <p:pic>
+        <p:nvPicPr>
+          <p:cNvPr id="34" name="Imagen 33">
+            <a:extLst>
+              <a:ext uri="{FF2B5EF4-FFF2-40B4-BE49-F238E27FC236}">
+                <a16:creationId xmlns:a16="http://schemas.microsoft.com/office/drawing/2014/main" id="{ADDB3985-091D-4C31-A369-99C1FE3472A4}"/>
+              </a:ext>
+            </a:extLst>
+          </p:cNvPr>
+          <p:cNvPicPr>
+            <a:picLocks noChangeAspect="1"/>
+          </p:cNvPicPr>
+          <p:nvPr/>
+        </p:nvPicPr>
+        <p:blipFill>
+          <a:blip r:embed="rId4">
+            <a:extLst>
+              <a:ext uri="{28A0092B-C50C-407E-A947-70E740481C1C}">
+                <a14:useLocalDpi xmlns:a14="http://schemas.microsoft.com/office/drawing/2010/main" val="0"/>
+              </a:ext>
+            </a:extLst>
+          </a:blip>
+          <a:stretch>
+            <a:fillRect/>
+          </a:stretch>
+        </p:blipFill>
+        <p:spPr>
+          <a:xfrm>
+            <a:off x="5644186" y="5820016"/>
+            <a:ext cx="903626" cy="903626"/>
+          </a:xfrm>
+          <a:prstGeom prst="rect">
+            <a:avLst/>
+          </a:prstGeom>
+        </p:spPr>
+      </p:pic>
+      <p:pic>
+        <p:nvPicPr>
+          <p:cNvPr id="36" name="Imagen 35">
+            <a:extLst>
+              <a:ext uri="{FF2B5EF4-FFF2-40B4-BE49-F238E27FC236}">
+                <a16:creationId xmlns:a16="http://schemas.microsoft.com/office/drawing/2014/main" id="{A8087DD6-6313-4EA2-8212-907E5F4AC7A2}"/>
+              </a:ext>
+            </a:extLst>
+          </p:cNvPr>
+          <p:cNvPicPr>
+            <a:picLocks noChangeAspect="1"/>
+          </p:cNvPicPr>
+          <p:nvPr/>
+        </p:nvPicPr>
+        <p:blipFill>
+          <a:blip r:embed="rId5">
+            <a:extLst>
+              <a:ext uri="{28A0092B-C50C-407E-A947-70E740481C1C}">
+                <a14:useLocalDpi xmlns:a14="http://schemas.microsoft.com/office/drawing/2010/main" val="0"/>
+              </a:ext>
+            </a:extLst>
+          </a:blip>
+          <a:stretch>
+            <a:fillRect/>
+          </a:stretch>
+        </p:blipFill>
+        <p:spPr>
+          <a:xfrm>
+            <a:off x="8698325" y="371061"/>
+            <a:ext cx="1372182" cy="1372182"/>
+          </a:xfrm>
+          <a:prstGeom prst="rect">
+            <a:avLst/>
+          </a:prstGeom>
+        </p:spPr>
+      </p:pic>
+      <p:cxnSp>
+        <p:nvCxnSpPr>
+          <p:cNvPr id="40" name="Conector recto de flecha 39">
+            <a:extLst>
+              <a:ext uri="{FF2B5EF4-FFF2-40B4-BE49-F238E27FC236}">
+                <a16:creationId xmlns:a16="http://schemas.microsoft.com/office/drawing/2014/main" id="{EE8BBB9F-6E50-44A0-B085-4B662555A384}"/>
+              </a:ext>
+            </a:extLst>
+          </p:cNvPr>
+          <p:cNvCxnSpPr>
+            <a:cxnSpLocks/>
+            <a:endCxn id="31" idx="0"/>
+          </p:cNvCxnSpPr>
+          <p:nvPr/>
+        </p:nvCxnSpPr>
+        <p:spPr>
+          <a:xfrm>
+            <a:off x="6096000" y="2063317"/>
+            <a:ext cx="0" cy="896897"/>
+          </a:xfrm>
+          <a:prstGeom prst="straightConnector1">
+            <a:avLst/>
+          </a:prstGeom>
+          <a:ln w="76200">
+            <a:solidFill>
+              <a:schemeClr val="tx1"/>
+            </a:solidFill>
+            <a:tailEnd type="triangle"/>
+          </a:ln>
+        </p:spPr>
+        <p:style>
+          <a:lnRef idx="1">
+            <a:schemeClr val="accent1"/>
+          </a:lnRef>
+          <a:fillRef idx="0">
+            <a:schemeClr val="accent1"/>
+          </a:fillRef>
+          <a:effectRef idx="0">
+            <a:schemeClr val="accent1"/>
+          </a:effectRef>
+          <a:fontRef idx="minor">
+            <a:schemeClr val="tx1"/>
+          </a:fontRef>
+        </p:style>
+      </p:cxnSp>
+      <p:cxnSp>
+        <p:nvCxnSpPr>
+          <p:cNvPr id="42" name="Conector recto de flecha 41">
+            <a:extLst>
+              <a:ext uri="{FF2B5EF4-FFF2-40B4-BE49-F238E27FC236}">
+                <a16:creationId xmlns:a16="http://schemas.microsoft.com/office/drawing/2014/main" id="{D7E4C31A-8455-4845-B2D3-FE6C295A6C3F}"/>
+              </a:ext>
+            </a:extLst>
+          </p:cNvPr>
+          <p:cNvCxnSpPr>
+            <a:cxnSpLocks/>
+            <a:stCxn id="31" idx="2"/>
+            <a:endCxn id="33" idx="0"/>
+          </p:cNvCxnSpPr>
+          <p:nvPr/>
+        </p:nvCxnSpPr>
+        <p:spPr>
+          <a:xfrm>
+            <a:off x="6096000" y="3789767"/>
+            <a:ext cx="0" cy="445018"/>
+          </a:xfrm>
+          <a:prstGeom prst="straightConnector1">
+            <a:avLst/>
+          </a:prstGeom>
+          <a:ln w="76200">
+            <a:solidFill>
+              <a:schemeClr val="tx1"/>
+            </a:solidFill>
+            <a:tailEnd type="triangle"/>
+          </a:ln>
+        </p:spPr>
+        <p:style>
+          <a:lnRef idx="1">
+            <a:schemeClr val="accent1"/>
+          </a:lnRef>
+          <a:fillRef idx="0">
+            <a:schemeClr val="accent1"/>
+          </a:fillRef>
+          <a:effectRef idx="0">
+            <a:schemeClr val="accent1"/>
+          </a:effectRef>
+          <a:fontRef idx="minor">
+            <a:schemeClr val="tx1"/>
+          </a:fontRef>
+        </p:style>
+      </p:cxnSp>
+      <p:cxnSp>
+        <p:nvCxnSpPr>
+          <p:cNvPr id="46" name="Conector recto de flecha 45">
+            <a:extLst>
+              <a:ext uri="{FF2B5EF4-FFF2-40B4-BE49-F238E27FC236}">
+                <a16:creationId xmlns:a16="http://schemas.microsoft.com/office/drawing/2014/main" id="{F1C39A21-FC36-4B24-A138-B73CE7E2D4A3}"/>
+              </a:ext>
+            </a:extLst>
+          </p:cNvPr>
+          <p:cNvCxnSpPr>
+            <a:cxnSpLocks/>
+          </p:cNvCxnSpPr>
+          <p:nvPr/>
+        </p:nvCxnSpPr>
+        <p:spPr>
+          <a:xfrm>
+            <a:off x="5844208" y="5064338"/>
+            <a:ext cx="0" cy="755678"/>
+          </a:xfrm>
+          <a:prstGeom prst="straightConnector1">
+            <a:avLst/>
+          </a:prstGeom>
+          <a:ln w="76200">
+            <a:solidFill>
+              <a:schemeClr val="tx1"/>
+            </a:solidFill>
+            <a:tailEnd type="triangle"/>
+          </a:ln>
+        </p:spPr>
+        <p:style>
+          <a:lnRef idx="1">
+            <a:schemeClr val="accent1"/>
+          </a:lnRef>
+          <a:fillRef idx="0">
+            <a:schemeClr val="accent1"/>
+          </a:fillRef>
+          <a:effectRef idx="0">
+            <a:schemeClr val="accent1"/>
+          </a:effectRef>
+          <a:fontRef idx="minor">
+            <a:schemeClr val="tx1"/>
+          </a:fontRef>
+        </p:style>
+      </p:cxnSp>
+      <p:sp>
+        <p:nvSpPr>
+          <p:cNvPr id="48" name="CuadroTexto 47">
+            <a:extLst>
+              <a:ext uri="{FF2B5EF4-FFF2-40B4-BE49-F238E27FC236}">
+                <a16:creationId xmlns:a16="http://schemas.microsoft.com/office/drawing/2014/main" id="{F3318C54-EA7C-419B-BBEB-09E7D8B8086C}"/>
+              </a:ext>
+            </a:extLst>
+          </p:cNvPr>
+          <p:cNvSpPr txBox="1"/>
+          <p:nvPr/>
+        </p:nvSpPr>
+        <p:spPr>
+          <a:xfrm>
+            <a:off x="4054798" y="1802151"/>
+            <a:ext cx="2214386" cy="369332"/>
+          </a:xfrm>
+          <a:prstGeom prst="rect">
+            <a:avLst/>
+          </a:prstGeom>
+          <a:noFill/>
+        </p:spPr>
+        <p:txBody>
+          <a:bodyPr wrap="square" rtlCol="0">
+            <a:spAutoFit/>
+          </a:bodyPr>
+          <a:lstStyle/>
+          <a:p>
+            <a:r>
+              <a:rPr lang="es-MX" dirty="0"/>
+              <a:t>Presentation Layer</a:t>
+            </a:r>
+          </a:p>
+        </p:txBody>
+      </p:sp>
+      <p:cxnSp>
+        <p:nvCxnSpPr>
+          <p:cNvPr id="49" name="Conector recto de flecha 48">
+            <a:extLst>
+              <a:ext uri="{FF2B5EF4-FFF2-40B4-BE49-F238E27FC236}">
+                <a16:creationId xmlns:a16="http://schemas.microsoft.com/office/drawing/2014/main" id="{C90420CF-C796-470C-A9F0-9F6D3F95A38E}"/>
+              </a:ext>
+            </a:extLst>
+          </p:cNvPr>
+          <p:cNvCxnSpPr>
+            <a:cxnSpLocks/>
+          </p:cNvCxnSpPr>
+          <p:nvPr/>
+        </p:nvCxnSpPr>
+        <p:spPr>
+          <a:xfrm>
+            <a:off x="7308574" y="821217"/>
+            <a:ext cx="1389751" cy="0"/>
+          </a:xfrm>
+          <a:prstGeom prst="straightConnector1">
+            <a:avLst/>
+          </a:prstGeom>
+          <a:ln w="76200">
+            <a:solidFill>
+              <a:schemeClr val="tx1"/>
+            </a:solidFill>
+            <a:tailEnd type="triangle"/>
+          </a:ln>
+        </p:spPr>
+        <p:style>
+          <a:lnRef idx="1">
+            <a:schemeClr val="accent1"/>
+          </a:lnRef>
+          <a:fillRef idx="0">
+            <a:schemeClr val="accent1"/>
+          </a:fillRef>
+          <a:effectRef idx="0">
+            <a:schemeClr val="accent1"/>
+          </a:effectRef>
+          <a:fontRef idx="minor">
+            <a:schemeClr val="tx1"/>
+          </a:fontRef>
+        </p:style>
+      </p:cxnSp>
+      <p:cxnSp>
+        <p:nvCxnSpPr>
+          <p:cNvPr id="51" name="Conector recto de flecha 50">
+            <a:extLst>
+              <a:ext uri="{FF2B5EF4-FFF2-40B4-BE49-F238E27FC236}">
+                <a16:creationId xmlns:a16="http://schemas.microsoft.com/office/drawing/2014/main" id="{284D3E57-EA6C-4249-8817-1BA148145DA4}"/>
+              </a:ext>
+            </a:extLst>
+          </p:cNvPr>
+          <p:cNvCxnSpPr>
+            <a:cxnSpLocks/>
+          </p:cNvCxnSpPr>
+          <p:nvPr/>
+        </p:nvCxnSpPr>
+        <p:spPr>
+          <a:xfrm flipH="1">
+            <a:off x="7308575" y="1166552"/>
+            <a:ext cx="1389750" cy="19461"/>
+          </a:xfrm>
+          <a:prstGeom prst="straightConnector1">
+            <a:avLst/>
+          </a:prstGeom>
+          <a:ln w="76200">
+            <a:solidFill>
+              <a:schemeClr val="tx1"/>
+            </a:solidFill>
+            <a:tailEnd type="triangle"/>
+          </a:ln>
+        </p:spPr>
+        <p:style>
+          <a:lnRef idx="1">
+            <a:schemeClr val="accent1"/>
+          </a:lnRef>
+          <a:fillRef idx="0">
+            <a:schemeClr val="accent1"/>
+          </a:fillRef>
+          <a:effectRef idx="0">
+            <a:schemeClr val="accent1"/>
+          </a:effectRef>
+          <a:fontRef idx="minor">
+            <a:schemeClr val="tx1"/>
+          </a:fontRef>
+        </p:style>
+      </p:cxnSp>
+      <p:cxnSp>
+        <p:nvCxnSpPr>
+          <p:cNvPr id="56" name="Conector recto de flecha 55">
+            <a:extLst>
+              <a:ext uri="{FF2B5EF4-FFF2-40B4-BE49-F238E27FC236}">
+                <a16:creationId xmlns:a16="http://schemas.microsoft.com/office/drawing/2014/main" id="{19063F80-6640-4AA9-8C9C-2ED8AFE485C5}"/>
+              </a:ext>
+            </a:extLst>
+          </p:cNvPr>
+          <p:cNvCxnSpPr>
+            <a:cxnSpLocks/>
+          </p:cNvCxnSpPr>
+          <p:nvPr/>
+        </p:nvCxnSpPr>
+        <p:spPr>
+          <a:xfrm flipV="1">
+            <a:off x="6301121" y="4999386"/>
+            <a:ext cx="0" cy="820630"/>
+          </a:xfrm>
+          <a:prstGeom prst="straightConnector1">
+            <a:avLst/>
+          </a:prstGeom>
+          <a:ln w="76200">
+            <a:solidFill>
+              <a:schemeClr val="tx1"/>
+            </a:solidFill>
+            <a:tailEnd type="triangle"/>
+          </a:ln>
+        </p:spPr>
+        <p:style>
+          <a:lnRef idx="1">
+            <a:schemeClr val="accent1"/>
+          </a:lnRef>
+          <a:fillRef idx="0">
+            <a:schemeClr val="accent1"/>
+          </a:fillRef>
+          <a:effectRef idx="0">
+            <a:schemeClr val="accent1"/>
+          </a:effectRef>
+          <a:fontRef idx="minor">
+            <a:schemeClr val="tx1"/>
+          </a:fontRef>
+        </p:style>
+      </p:cxnSp>
     </p:spTree>
     <p:extLst>
       <p:ext uri="{BB962C8B-B14F-4D97-AF65-F5344CB8AC3E}">
-        <p14:creationId xmlns:p14="http://schemas.microsoft.com/office/powerpoint/2010/main" val="4133486506"/>
+        <p14:creationId xmlns:p14="http://schemas.microsoft.com/office/powerpoint/2010/main" val="4101235804"/>
       </p:ext>
     </p:extLst>
   </p:cSld>

</xml_diff>